<commit_message>
Gliederung hinzugefügt, Projekt erweitert
</commit_message>
<xml_diff>
--- a/Dokumente/Zwischenpraesentation_BA.pptx
+++ b/Dokumente/Zwischenpraesentation_BA.pptx
@@ -10,10 +10,10 @@
     <p:sldMasterId id="2147483697" r:id="rId6"/>
   </p:sldMasterIdLst>
   <p:notesMasterIdLst>
-    <p:notesMasterId r:id="rId18"/>
+    <p:notesMasterId r:id="rId26"/>
   </p:notesMasterIdLst>
   <p:handoutMasterIdLst>
-    <p:handoutMasterId r:id="rId19"/>
+    <p:handoutMasterId r:id="rId27"/>
   </p:handoutMasterIdLst>
   <p:sldIdLst>
     <p:sldId id="355" r:id="rId7"/>
@@ -27,6 +27,14 @@
     <p:sldId id="400" r:id="rId15"/>
     <p:sldId id="401" r:id="rId16"/>
     <p:sldId id="403" r:id="rId17"/>
+    <p:sldId id="404" r:id="rId18"/>
+    <p:sldId id="411" r:id="rId19"/>
+    <p:sldId id="405" r:id="rId20"/>
+    <p:sldId id="406" r:id="rId21"/>
+    <p:sldId id="407" r:id="rId22"/>
+    <p:sldId id="408" r:id="rId23"/>
+    <p:sldId id="410" r:id="rId24"/>
+    <p:sldId id="409" r:id="rId25"/>
   </p:sldIdLst>
   <p:sldSz cx="9144000" cy="5143500" type="screen16x9"/>
   <p:notesSz cx="9925050" cy="6665913"/>
@@ -306,7 +314,7 @@
               <a:pPr>
                 <a:defRPr/>
               </a:pPr>
-              <a:t>03/02/2018</a:t>
+              <a:t>04/02/2018</a:t>
             </a:fld>
             <a:endParaRPr lang="en-GB" dirty="0"/>
           </a:p>
@@ -525,7 +533,7 @@
               <a:pPr>
                 <a:defRPr/>
               </a:pPr>
-              <a:t>03/02/2018</a:t>
+              <a:t>04/02/2018</a:t>
             </a:fld>
             <a:endParaRPr lang="en-GB" dirty="0"/>
           </a:p>
@@ -5580,7 +5588,7 @@
                 </a:solidFill>
                 <a:latin typeface="+mn-lt"/>
               </a:rPr>
-              <a:t>Lehrstuhl für Mustertechnik</a:t>
+              <a:t>Lehrstuhl für Wirtschaftsinformatik</a:t>
             </a:r>
           </a:p>
           <a:p>
@@ -5596,7 +5604,7 @@
                 </a:solidFill>
                 <a:latin typeface="+mn-lt"/>
               </a:rPr>
-              <a:t>Fakultät für Musterverfahren</a:t>
+              <a:t>Fakultät für Informatik</a:t>
             </a:r>
           </a:p>
           <a:p>
@@ -6170,6 +6178,98 @@
           </a:p>
         </p:txBody>
       </p:sp>
+      <p:sp>
+        <p:nvSpPr>
+          <p:cNvPr id="7" name="Textfeld 6">
+            <a:extLst>
+              <a:ext uri="{FF2B5EF4-FFF2-40B4-BE49-F238E27FC236}">
+                <a16:creationId xmlns:a16="http://schemas.microsoft.com/office/drawing/2014/main" id="{09601281-0DF3-435B-86D1-8CB20641F79C}"/>
+              </a:ext>
+            </a:extLst>
+          </p:cNvPr>
+          <p:cNvSpPr txBox="1"/>
+          <p:nvPr userDrawn="1"/>
+        </p:nvSpPr>
+        <p:spPr>
+          <a:xfrm>
+            <a:off x="319506" y="321468"/>
+            <a:ext cx="7160425" cy="346249"/>
+          </a:xfrm>
+          <a:prstGeom prst="rect">
+            <a:avLst/>
+          </a:prstGeom>
+          <a:noFill/>
+        </p:spPr>
+        <p:txBody>
+          <a:bodyPr wrap="square" lIns="0" tIns="0" rIns="0" bIns="0" rtlCol="0">
+            <a:spAutoFit/>
+          </a:bodyPr>
+          <a:lstStyle/>
+          <a:p>
+            <a:pPr>
+              <a:lnSpc>
+                <a:spcPts val="900"/>
+              </a:lnSpc>
+            </a:pPr>
+            <a:r>
+              <a:rPr lang="de-DE" sz="800" dirty="0">
+                <a:solidFill>
+                  <a:schemeClr val="bg2"/>
+                </a:solidFill>
+                <a:latin typeface="+mn-lt"/>
+              </a:rPr>
+              <a:t>Lehrstuhl für Wirtschaftsinformatik</a:t>
+            </a:r>
+          </a:p>
+          <a:p>
+            <a:pPr>
+              <a:lnSpc>
+                <a:spcPts val="900"/>
+              </a:lnSpc>
+            </a:pPr>
+            <a:r>
+              <a:rPr lang="de-DE" sz="800" dirty="0">
+                <a:solidFill>
+                  <a:schemeClr val="bg2"/>
+                </a:solidFill>
+                <a:latin typeface="+mn-lt"/>
+              </a:rPr>
+              <a:t>Fakultät für Informatik</a:t>
+            </a:r>
+          </a:p>
+          <a:p>
+            <a:pPr>
+              <a:lnSpc>
+                <a:spcPts val="900"/>
+              </a:lnSpc>
+            </a:pPr>
+            <a:r>
+              <a:rPr lang="de-DE" sz="800" dirty="0">
+                <a:solidFill>
+                  <a:schemeClr val="bg2"/>
+                </a:solidFill>
+                <a:latin typeface="+mn-lt"/>
+              </a:rPr>
+              <a:t>Technische Universität</a:t>
+            </a:r>
+            <a:r>
+              <a:rPr lang="de-DE" sz="800" baseline="0" dirty="0">
+                <a:solidFill>
+                  <a:schemeClr val="bg2"/>
+                </a:solidFill>
+                <a:latin typeface="+mn-lt"/>
+              </a:rPr>
+              <a:t> München</a:t>
+            </a:r>
+            <a:endParaRPr lang="de-DE" sz="800" dirty="0">
+              <a:solidFill>
+                <a:schemeClr val="bg2"/>
+              </a:solidFill>
+              <a:latin typeface="+mn-lt"/>
+            </a:endParaRPr>
+          </a:p>
+        </p:txBody>
+      </p:sp>
     </p:spTree>
   </p:cSld>
   <p:clrMap bg1="lt1" tx1="dk1" bg2="lt2" tx2="dk2" accent1="accent1" accent2="accent2" accent3="accent3" accent4="accent4" accent5="accent5" accent6="accent6" hlink="hlink" folHlink="folHlink"/>
@@ -7804,37 +7904,32 @@
             <p:ph type="title"/>
           </p:nvPr>
         </p:nvSpPr>
+        <p:spPr/>
+        <p:txBody>
+          <a:bodyPr/>
+          <a:lstStyle/>
+          <a:p>
+            <a:r>
+              <a:rPr lang="de-DE" dirty="0"/>
+              <a:t>Visualisierung von vernetztem Wissen als Graph im virtuellen Raum</a:t>
+            </a:r>
+          </a:p>
+        </p:txBody>
+      </p:sp>
+      <p:sp>
+        <p:nvSpPr>
+          <p:cNvPr id="3" name="Inhaltsplatzhalter 2"/>
+          <p:cNvSpPr>
+            <a:spLocks noGrp="1"/>
+          </p:cNvSpPr>
+          <p:nvPr>
+            <p:ph idx="10"/>
+          </p:nvPr>
+        </p:nvSpPr>
         <p:spPr>
           <a:xfrm>
-            <a:off x="319087" y="881945"/>
-            <a:ext cx="8508999" cy="808310"/>
-          </a:xfrm>
-        </p:spPr>
-        <p:txBody>
-          <a:bodyPr/>
-          <a:lstStyle/>
-          <a:p>
-            <a:r>
-              <a:rPr lang="de-DE" dirty="0"/>
-              <a:t>Visualisierung von vernetztem Wissen als Graph im virtuellen Raum</a:t>
-            </a:r>
-          </a:p>
-        </p:txBody>
-      </p:sp>
-      <p:sp>
-        <p:nvSpPr>
-          <p:cNvPr id="3" name="Inhaltsplatzhalter 2"/>
-          <p:cNvSpPr>
-            <a:spLocks noGrp="1"/>
-          </p:cNvSpPr>
-          <p:nvPr>
-            <p:ph idx="10"/>
-          </p:nvPr>
-        </p:nvSpPr>
-        <p:spPr>
-          <a:xfrm>
-            <a:off x="319088" y="2015836"/>
-            <a:ext cx="8508999" cy="423798"/>
+            <a:off x="319088" y="1821242"/>
+            <a:ext cx="8508999" cy="618391"/>
           </a:xfrm>
         </p:spPr>
         <p:txBody>
@@ -7915,34 +8010,35 @@
           <a:chExt cx="0" cy="0"/>
         </a:xfrm>
       </p:grpSpPr>
-      <p:sp>
-        <p:nvSpPr>
-          <p:cNvPr id="7" name="Inhaltsplatzhalter 6">
+      <p:pic>
+        <p:nvPicPr>
+          <p:cNvPr id="6" name="Inhaltsplatzhalter 5">
             <a:extLst>
               <a:ext uri="{FF2B5EF4-FFF2-40B4-BE49-F238E27FC236}">
-                <a16:creationId xmlns:a16="http://schemas.microsoft.com/office/drawing/2014/main" id="{C32ECBA7-2872-4CFF-9B81-9B3BEF5FDB19}"/>
+                <a16:creationId xmlns:a16="http://schemas.microsoft.com/office/drawing/2014/main" id="{76EAA0EF-1327-416A-974B-0DBC9C3677EB}"/>
               </a:ext>
             </a:extLst>
           </p:cNvPr>
-          <p:cNvSpPr>
-            <a:spLocks noGrp="1"/>
-          </p:cNvSpPr>
+          <p:cNvPicPr>
+            <a:picLocks noGrp="1" noChangeAspect="1"/>
+          </p:cNvPicPr>
           <p:nvPr>
             <p:ph idx="1"/>
           </p:nvPr>
-        </p:nvSpPr>
-        <p:spPr/>
-        <p:txBody>
-          <a:bodyPr/>
-          <a:lstStyle/>
-          <a:p>
-            <a:r>
-              <a:rPr lang="de-DE" dirty="0"/>
-              <a:t>Hier Bilder einfügen…</a:t>
-            </a:r>
-          </a:p>
-        </p:txBody>
-      </p:sp>
+        </p:nvPicPr>
+        <p:blipFill>
+          <a:blip r:embed="rId3"/>
+          <a:stretch>
+            <a:fillRect/>
+          </a:stretch>
+        </p:blipFill>
+        <p:spPr>
+          <a:xfrm>
+            <a:off x="3774186" y="1893902"/>
+            <a:ext cx="2156073" cy="2303317"/>
+          </a:xfrm>
+        </p:spPr>
+      </p:pic>
       <p:sp>
         <p:nvSpPr>
           <p:cNvPr id="3" name="Titel 2">
@@ -7959,14 +8055,19 @@
             <p:ph type="title"/>
           </p:nvPr>
         </p:nvSpPr>
-        <p:spPr/>
+        <p:spPr>
+          <a:xfrm>
+            <a:off x="319090" y="972000"/>
+            <a:ext cx="8508999" cy="791179"/>
+          </a:xfrm>
+        </p:spPr>
         <p:txBody>
           <a:bodyPr/>
           <a:lstStyle/>
           <a:p>
             <a:r>
               <a:rPr lang="de-DE" dirty="0"/>
-              <a:t>Vergleich der Ergebnisse der Algorithmen</a:t>
+              <a:t>Gegenüberstellung von Algorithmen zur Visualisierung von Graphen</a:t>
             </a:r>
           </a:p>
         </p:txBody>
@@ -8027,6 +8128,228 @@
               <a:t>Sonja Stefani | Visualisierung von vernetztem Wissen als Graph im virtuellen Raum</a:t>
             </a:r>
             <a:endParaRPr lang="en-US" dirty="0"/>
+          </a:p>
+        </p:txBody>
+      </p:sp>
+      <p:pic>
+        <p:nvPicPr>
+          <p:cNvPr id="9" name="Grafik 8">
+            <a:extLst>
+              <a:ext uri="{FF2B5EF4-FFF2-40B4-BE49-F238E27FC236}">
+                <a16:creationId xmlns:a16="http://schemas.microsoft.com/office/drawing/2014/main" id="{2F24BD7E-30F1-44CD-9F99-F67D20029337}"/>
+              </a:ext>
+            </a:extLst>
+          </p:cNvPr>
+          <p:cNvPicPr>
+            <a:picLocks noChangeAspect="1"/>
+          </p:cNvPicPr>
+          <p:nvPr/>
+        </p:nvPicPr>
+        <p:blipFill>
+          <a:blip r:embed="rId4"/>
+          <a:stretch>
+            <a:fillRect/>
+          </a:stretch>
+        </p:blipFill>
+        <p:spPr>
+          <a:xfrm>
+            <a:off x="319090" y="1787914"/>
+            <a:ext cx="2585444" cy="2515297"/>
+          </a:xfrm>
+          <a:prstGeom prst="rect">
+            <a:avLst/>
+          </a:prstGeom>
+        </p:spPr>
+      </p:pic>
+      <p:pic>
+        <p:nvPicPr>
+          <p:cNvPr id="11" name="Grafik 10">
+            <a:extLst>
+              <a:ext uri="{FF2B5EF4-FFF2-40B4-BE49-F238E27FC236}">
+                <a16:creationId xmlns:a16="http://schemas.microsoft.com/office/drawing/2014/main" id="{01C53FA5-0E0A-4B57-9BC8-36745A7EACE7}"/>
+              </a:ext>
+            </a:extLst>
+          </p:cNvPr>
+          <p:cNvPicPr>
+            <a:picLocks noChangeAspect="1"/>
+          </p:cNvPicPr>
+          <p:nvPr/>
+        </p:nvPicPr>
+        <p:blipFill>
+          <a:blip r:embed="rId5"/>
+          <a:stretch>
+            <a:fillRect/>
+          </a:stretch>
+        </p:blipFill>
+        <p:spPr>
+          <a:xfrm>
+            <a:off x="6799912" y="2085358"/>
+            <a:ext cx="2027096" cy="1920406"/>
+          </a:xfrm>
+          <a:prstGeom prst="rect">
+            <a:avLst/>
+          </a:prstGeom>
+        </p:spPr>
+      </p:pic>
+      <p:sp>
+        <p:nvSpPr>
+          <p:cNvPr id="12" name="Textfeld 11">
+            <a:extLst>
+              <a:ext uri="{FF2B5EF4-FFF2-40B4-BE49-F238E27FC236}">
+                <a16:creationId xmlns:a16="http://schemas.microsoft.com/office/drawing/2014/main" id="{AC2B714E-EEC1-4065-91FE-61B01109CEA6}"/>
+              </a:ext>
+            </a:extLst>
+          </p:cNvPr>
+          <p:cNvSpPr txBox="1"/>
+          <p:nvPr/>
+        </p:nvSpPr>
+        <p:spPr>
+          <a:xfrm>
+            <a:off x="584056" y="4402190"/>
+            <a:ext cx="2267108" cy="176908"/>
+          </a:xfrm>
+          <a:prstGeom prst="rect">
+            <a:avLst/>
+          </a:prstGeom>
+          <a:noFill/>
+        </p:spPr>
+        <p:txBody>
+          <a:bodyPr wrap="square" lIns="0" tIns="0" rIns="0" bIns="0" rtlCol="0">
+            <a:spAutoFit/>
+          </a:bodyPr>
+          <a:lstStyle/>
+          <a:p>
+            <a:pPr>
+              <a:lnSpc>
+                <a:spcPct val="114000"/>
+              </a:lnSpc>
+            </a:pPr>
+            <a:r>
+              <a:rPr lang="de-DE" sz="1100" i="1" dirty="0" err="1">
+                <a:latin typeface="+mn-lt"/>
+              </a:rPr>
+              <a:t>Fruchterman</a:t>
+            </a:r>
+            <a:r>
+              <a:rPr lang="de-DE" sz="1100" i="1" dirty="0">
+                <a:latin typeface="+mn-lt"/>
+              </a:rPr>
+              <a:t>, </a:t>
+            </a:r>
+            <a:r>
+              <a:rPr lang="de-DE" sz="1100" i="1" dirty="0" err="1">
+                <a:latin typeface="+mn-lt"/>
+              </a:rPr>
+              <a:t>Reingold</a:t>
+            </a:r>
+            <a:r>
+              <a:rPr lang="de-DE" sz="1100" i="1" dirty="0">
+                <a:latin typeface="+mn-lt"/>
+              </a:rPr>
+              <a:t> (1991)</a:t>
+            </a:r>
+          </a:p>
+        </p:txBody>
+      </p:sp>
+      <p:sp>
+        <p:nvSpPr>
+          <p:cNvPr id="13" name="Textfeld 12">
+            <a:extLst>
+              <a:ext uri="{FF2B5EF4-FFF2-40B4-BE49-F238E27FC236}">
+                <a16:creationId xmlns:a16="http://schemas.microsoft.com/office/drawing/2014/main" id="{A5831DD9-9B39-48E8-B3FA-90195152FE6E}"/>
+              </a:ext>
+            </a:extLst>
+          </p:cNvPr>
+          <p:cNvSpPr txBox="1"/>
+          <p:nvPr/>
+        </p:nvSpPr>
+        <p:spPr>
+          <a:xfrm>
+            <a:off x="4205130" y="4402190"/>
+            <a:ext cx="1470195" cy="194071"/>
+          </a:xfrm>
+          <a:prstGeom prst="rect">
+            <a:avLst/>
+          </a:prstGeom>
+          <a:noFill/>
+        </p:spPr>
+        <p:txBody>
+          <a:bodyPr wrap="square" lIns="0" tIns="0" rIns="0" bIns="0" rtlCol="0">
+            <a:spAutoFit/>
+          </a:bodyPr>
+          <a:lstStyle/>
+          <a:p>
+            <a:pPr>
+              <a:lnSpc>
+                <a:spcPct val="114000"/>
+              </a:lnSpc>
+            </a:pPr>
+            <a:r>
+              <a:rPr lang="de-DE" sz="1100" i="1" dirty="0">
+                <a:latin typeface="+mn-lt"/>
+              </a:rPr>
+              <a:t>Davidson, Harel (1996)</a:t>
+            </a:r>
+          </a:p>
+        </p:txBody>
+      </p:sp>
+      <p:sp>
+        <p:nvSpPr>
+          <p:cNvPr id="14" name="Textfeld 13">
+            <a:extLst>
+              <a:ext uri="{FF2B5EF4-FFF2-40B4-BE49-F238E27FC236}">
+                <a16:creationId xmlns:a16="http://schemas.microsoft.com/office/drawing/2014/main" id="{445CF7C8-0F2F-4540-B459-2669018D5628}"/>
+              </a:ext>
+            </a:extLst>
+          </p:cNvPr>
+          <p:cNvSpPr txBox="1"/>
+          <p:nvPr/>
+        </p:nvSpPr>
+        <p:spPr>
+          <a:xfrm>
+            <a:off x="7029291" y="4385027"/>
+            <a:ext cx="1470195" cy="176908"/>
+          </a:xfrm>
+          <a:prstGeom prst="rect">
+            <a:avLst/>
+          </a:prstGeom>
+          <a:noFill/>
+        </p:spPr>
+        <p:txBody>
+          <a:bodyPr wrap="square" lIns="0" tIns="0" rIns="0" bIns="0" rtlCol="0">
+            <a:spAutoFit/>
+          </a:bodyPr>
+          <a:lstStyle/>
+          <a:p>
+            <a:pPr>
+              <a:lnSpc>
+                <a:spcPct val="114000"/>
+              </a:lnSpc>
+            </a:pPr>
+            <a:r>
+              <a:rPr lang="de-DE" sz="1100" i="1" dirty="0" err="1">
+                <a:latin typeface="+mn-lt"/>
+              </a:rPr>
+              <a:t>Kamada</a:t>
+            </a:r>
+            <a:r>
+              <a:rPr lang="de-DE" sz="1100" i="1" dirty="0">
+                <a:latin typeface="+mn-lt"/>
+              </a:rPr>
+              <a:t>, </a:t>
+            </a:r>
+            <a:r>
+              <a:rPr lang="de-DE" sz="1100" i="1" dirty="0" err="1">
+                <a:latin typeface="+mn-lt"/>
+              </a:rPr>
+              <a:t>Kawai</a:t>
+            </a:r>
+            <a:r>
+              <a:rPr lang="de-DE" sz="1100" i="1" dirty="0">
+                <a:latin typeface="+mn-lt"/>
+              </a:rPr>
+              <a:t> (1989)</a:t>
+            </a:r>
           </a:p>
         </p:txBody>
       </p:sp>
@@ -8300,6 +8623,2268 @@
 </p:sld>
 </file>
 
+<file path=ppt/slides/slide12.xml><?xml version="1.0" encoding="utf-8"?>
+<p:sld xmlns:a="http://schemas.openxmlformats.org/drawingml/2006/main" xmlns:r="http://schemas.openxmlformats.org/officeDocument/2006/relationships" xmlns:p="http://schemas.openxmlformats.org/presentationml/2006/main">
+  <p:cSld>
+    <p:spTree>
+      <p:nvGrpSpPr>
+        <p:cNvPr id="1" name=""/>
+        <p:cNvGrpSpPr/>
+        <p:nvPr/>
+      </p:nvGrpSpPr>
+      <p:grpSpPr>
+        <a:xfrm>
+          <a:off x="0" y="0"/>
+          <a:ext cx="0" cy="0"/>
+          <a:chOff x="0" y="0"/>
+          <a:chExt cx="0" cy="0"/>
+        </a:xfrm>
+      </p:grpSpPr>
+      <p:sp>
+        <p:nvSpPr>
+          <p:cNvPr id="2" name="Inhaltsplatzhalter 1">
+            <a:extLst>
+              <a:ext uri="{FF2B5EF4-FFF2-40B4-BE49-F238E27FC236}">
+                <a16:creationId xmlns:a16="http://schemas.microsoft.com/office/drawing/2014/main" id="{C61F25D2-38CA-4886-B5C9-B8E3327D5FF7}"/>
+              </a:ext>
+            </a:extLst>
+          </p:cNvPr>
+          <p:cNvSpPr>
+            <a:spLocks noGrp="1"/>
+          </p:cNvSpPr>
+          <p:nvPr>
+            <p:ph idx="1"/>
+          </p:nvPr>
+        </p:nvSpPr>
+        <p:spPr/>
+        <p:txBody>
+          <a:bodyPr/>
+          <a:lstStyle/>
+          <a:p>
+            <a:r>
+              <a:rPr lang="en-US" dirty="0"/>
+              <a:t>Ivan Herman, Guy Melancon, and M Scott Marshall. Graph visualization and navigation in information visualization: A survey. </a:t>
+            </a:r>
+            <a:r>
+              <a:rPr lang="en-US" i="1" dirty="0"/>
+              <a:t>IEEE Transactions on visualization and computer graphics</a:t>
+            </a:r>
+            <a:r>
+              <a:rPr lang="en-US" dirty="0"/>
+              <a:t>, 6(1):24-43, 2000.</a:t>
+            </a:r>
+          </a:p>
+          <a:p>
+            <a:endParaRPr lang="en-US" dirty="0"/>
+          </a:p>
+          <a:p>
+            <a:r>
+              <a:rPr lang="de-DE" dirty="0"/>
+              <a:t>Ewald Terhart. </a:t>
+            </a:r>
+            <a:r>
+              <a:rPr lang="de-DE" i="1" dirty="0"/>
+              <a:t>Allgemeine Didaktik: Traditionen, Neuanfänge, Herausforderungen</a:t>
+            </a:r>
+            <a:r>
+              <a:rPr lang="de-DE" dirty="0"/>
+              <a:t>, </a:t>
+            </a:r>
+            <a:r>
+              <a:rPr lang="de-DE" dirty="0" err="1"/>
+              <a:t>pages</a:t>
+            </a:r>
+            <a:r>
+              <a:rPr lang="de-DE" dirty="0"/>
+              <a:t> 13-34. VS Verlag für Sozialwissenschaften, Wiesbaden, 2009.</a:t>
+            </a:r>
+          </a:p>
+          <a:p>
+            <a:endParaRPr lang="de-DE" dirty="0"/>
+          </a:p>
+          <a:p>
+            <a:r>
+              <a:rPr lang="de-DE" dirty="0"/>
+              <a:t>Gerstenmaier, Jochen, and Heinz Mandl. Wissenserwerb unter konstruktivistischer Perspektive. </a:t>
+            </a:r>
+            <a:r>
+              <a:rPr lang="de-DE" i="1" dirty="0"/>
+              <a:t>Zeitschrift für Pädagogik</a:t>
+            </a:r>
+            <a:r>
+              <a:rPr lang="de-DE" dirty="0"/>
+              <a:t> 41.6 (1995): 867-888.</a:t>
+            </a:r>
+          </a:p>
+          <a:p>
+            <a:endParaRPr lang="de-DE" dirty="0"/>
+          </a:p>
+          <a:p>
+            <a:r>
+              <a:rPr lang="de-DE" dirty="0"/>
+              <a:t>Dubs, Rolf. Konstruktivismus: einige Überlegungen aus der Sicht der Unterrichtsgestaltung. </a:t>
+            </a:r>
+            <a:r>
+              <a:rPr lang="de-DE" i="1" dirty="0"/>
+              <a:t>Zeitschrift für Pädagogik</a:t>
+            </a:r>
+            <a:r>
+              <a:rPr lang="de-DE" dirty="0"/>
+              <a:t> 41.6 (1995): 889-903.</a:t>
+            </a:r>
+          </a:p>
+        </p:txBody>
+      </p:sp>
+      <p:sp>
+        <p:nvSpPr>
+          <p:cNvPr id="3" name="Titel 2">
+            <a:extLst>
+              <a:ext uri="{FF2B5EF4-FFF2-40B4-BE49-F238E27FC236}">
+                <a16:creationId xmlns:a16="http://schemas.microsoft.com/office/drawing/2014/main" id="{C229D706-EF1F-4B16-8483-EB83250DA111}"/>
+              </a:ext>
+            </a:extLst>
+          </p:cNvPr>
+          <p:cNvSpPr>
+            <a:spLocks noGrp="1"/>
+          </p:cNvSpPr>
+          <p:nvPr>
+            <p:ph type="title"/>
+          </p:nvPr>
+        </p:nvSpPr>
+        <p:spPr>
+          <a:xfrm>
+            <a:off x="319090" y="972000"/>
+            <a:ext cx="8508999" cy="380810"/>
+          </a:xfrm>
+        </p:spPr>
+        <p:txBody>
+          <a:bodyPr/>
+          <a:lstStyle/>
+          <a:p>
+            <a:r>
+              <a:rPr lang="de-DE" dirty="0"/>
+              <a:t>Quellen</a:t>
+            </a:r>
+          </a:p>
+        </p:txBody>
+      </p:sp>
+      <p:sp>
+        <p:nvSpPr>
+          <p:cNvPr id="4" name="Foliennummernplatzhalter 3">
+            <a:extLst>
+              <a:ext uri="{FF2B5EF4-FFF2-40B4-BE49-F238E27FC236}">
+                <a16:creationId xmlns:a16="http://schemas.microsoft.com/office/drawing/2014/main" id="{E51213CA-EADD-4132-8457-1EA8009A7102}"/>
+              </a:ext>
+            </a:extLst>
+          </p:cNvPr>
+          <p:cNvSpPr>
+            <a:spLocks noGrp="1"/>
+          </p:cNvSpPr>
+          <p:nvPr>
+            <p:ph type="sldNum" sz="quarter" idx="11"/>
+          </p:nvPr>
+        </p:nvSpPr>
+        <p:spPr/>
+        <p:txBody>
+          <a:bodyPr/>
+          <a:lstStyle/>
+          <a:p>
+            <a:fld id="{CE58CB1E-F828-4F11-99E0-327109AF9DA4}" type="slidenum">
+              <a:rPr lang="de-DE" smtClean="0"/>
+              <a:pPr/>
+              <a:t>12</a:t>
+            </a:fld>
+            <a:endParaRPr lang="de-DE" dirty="0"/>
+          </a:p>
+        </p:txBody>
+      </p:sp>
+      <p:sp>
+        <p:nvSpPr>
+          <p:cNvPr id="5" name="Fußzeilenplatzhalter 4">
+            <a:extLst>
+              <a:ext uri="{FF2B5EF4-FFF2-40B4-BE49-F238E27FC236}">
+                <a16:creationId xmlns:a16="http://schemas.microsoft.com/office/drawing/2014/main" id="{F0569737-EB97-4B5F-A96C-6AFC7AC78F0A}"/>
+              </a:ext>
+            </a:extLst>
+          </p:cNvPr>
+          <p:cNvSpPr>
+            <a:spLocks noGrp="1"/>
+          </p:cNvSpPr>
+          <p:nvPr>
+            <p:ph type="ftr" sz="quarter" idx="12"/>
+          </p:nvPr>
+        </p:nvSpPr>
+        <p:spPr/>
+        <p:txBody>
+          <a:bodyPr/>
+          <a:lstStyle/>
+          <a:p>
+            <a:r>
+              <a:rPr lang="de-DE"/>
+              <a:t>Sonja Stefani | Visualisierung von vernetztem Wissen als Graph im virtuellen Raum</a:t>
+            </a:r>
+            <a:endParaRPr lang="en-US" dirty="0"/>
+          </a:p>
+        </p:txBody>
+      </p:sp>
+    </p:spTree>
+    <p:extLst>
+      <p:ext uri="{BB962C8B-B14F-4D97-AF65-F5344CB8AC3E}">
+        <p14:creationId xmlns:p14="http://schemas.microsoft.com/office/powerpoint/2010/main" val="3953980159"/>
+      </p:ext>
+    </p:extLst>
+  </p:cSld>
+  <p:clrMapOvr>
+    <a:masterClrMapping/>
+  </p:clrMapOvr>
+</p:sld>
+</file>
+
+<file path=ppt/slides/slide13.xml><?xml version="1.0" encoding="utf-8"?>
+<p:sld xmlns:a="http://schemas.openxmlformats.org/drawingml/2006/main" xmlns:r="http://schemas.openxmlformats.org/officeDocument/2006/relationships" xmlns:p="http://schemas.openxmlformats.org/presentationml/2006/main">
+  <p:cSld>
+    <p:spTree>
+      <p:nvGrpSpPr>
+        <p:cNvPr id="1" name=""/>
+        <p:cNvGrpSpPr/>
+        <p:nvPr/>
+      </p:nvGrpSpPr>
+      <p:grpSpPr>
+        <a:xfrm>
+          <a:off x="0" y="0"/>
+          <a:ext cx="0" cy="0"/>
+          <a:chOff x="0" y="0"/>
+          <a:chExt cx="0" cy="0"/>
+        </a:xfrm>
+      </p:grpSpPr>
+      <p:sp>
+        <p:nvSpPr>
+          <p:cNvPr id="2" name="Inhaltsplatzhalter 1">
+            <a:extLst>
+              <a:ext uri="{FF2B5EF4-FFF2-40B4-BE49-F238E27FC236}">
+                <a16:creationId xmlns:a16="http://schemas.microsoft.com/office/drawing/2014/main" id="{24497464-E26C-47C6-96E5-7EEC2F414220}"/>
+              </a:ext>
+            </a:extLst>
+          </p:cNvPr>
+          <p:cNvSpPr>
+            <a:spLocks noGrp="1"/>
+          </p:cNvSpPr>
+          <p:nvPr>
+            <p:ph idx="1"/>
+          </p:nvPr>
+        </p:nvSpPr>
+        <p:spPr/>
+        <p:txBody>
+          <a:bodyPr/>
+          <a:lstStyle/>
+          <a:p>
+            <a:r>
+              <a:rPr lang="en-US" dirty="0"/>
+              <a:t>Wikipedia. https://www.wikipedia.org. </a:t>
+            </a:r>
+            <a:r>
+              <a:rPr lang="en-US" dirty="0" err="1"/>
+              <a:t>Aufgerufen</a:t>
+            </a:r>
+            <a:r>
+              <a:rPr lang="en-US" dirty="0"/>
+              <a:t>: 04.02.2018</a:t>
+            </a:r>
+            <a:r>
+              <a:rPr lang="de-DE" dirty="0"/>
+              <a:t>.</a:t>
+            </a:r>
+          </a:p>
+          <a:p>
+            <a:endParaRPr lang="de-DE" dirty="0"/>
+          </a:p>
+        </p:txBody>
+      </p:sp>
+      <p:sp>
+        <p:nvSpPr>
+          <p:cNvPr id="3" name="Titel 2">
+            <a:extLst>
+              <a:ext uri="{FF2B5EF4-FFF2-40B4-BE49-F238E27FC236}">
+                <a16:creationId xmlns:a16="http://schemas.microsoft.com/office/drawing/2014/main" id="{2A6E365B-3D47-45B3-830C-EEA7C2D634A6}"/>
+              </a:ext>
+            </a:extLst>
+          </p:cNvPr>
+          <p:cNvSpPr>
+            <a:spLocks noGrp="1"/>
+          </p:cNvSpPr>
+          <p:nvPr>
+            <p:ph type="title"/>
+          </p:nvPr>
+        </p:nvSpPr>
+        <p:spPr>
+          <a:xfrm>
+            <a:off x="319090" y="972000"/>
+            <a:ext cx="8508999" cy="380810"/>
+          </a:xfrm>
+        </p:spPr>
+        <p:txBody>
+          <a:bodyPr/>
+          <a:lstStyle/>
+          <a:p>
+            <a:r>
+              <a:rPr lang="de-DE" dirty="0"/>
+              <a:t>Quellen</a:t>
+            </a:r>
+          </a:p>
+        </p:txBody>
+      </p:sp>
+      <p:sp>
+        <p:nvSpPr>
+          <p:cNvPr id="4" name="Foliennummernplatzhalter 3">
+            <a:extLst>
+              <a:ext uri="{FF2B5EF4-FFF2-40B4-BE49-F238E27FC236}">
+                <a16:creationId xmlns:a16="http://schemas.microsoft.com/office/drawing/2014/main" id="{ECB92708-64AC-462C-81BC-E866F44D45FD}"/>
+              </a:ext>
+            </a:extLst>
+          </p:cNvPr>
+          <p:cNvSpPr>
+            <a:spLocks noGrp="1"/>
+          </p:cNvSpPr>
+          <p:nvPr>
+            <p:ph type="sldNum" sz="quarter" idx="11"/>
+          </p:nvPr>
+        </p:nvSpPr>
+        <p:spPr/>
+        <p:txBody>
+          <a:bodyPr/>
+          <a:lstStyle/>
+          <a:p>
+            <a:fld id="{CE58CB1E-F828-4F11-99E0-327109AF9DA4}" type="slidenum">
+              <a:rPr lang="de-DE" smtClean="0"/>
+              <a:pPr/>
+              <a:t>13</a:t>
+            </a:fld>
+            <a:endParaRPr lang="de-DE" dirty="0"/>
+          </a:p>
+        </p:txBody>
+      </p:sp>
+      <p:sp>
+        <p:nvSpPr>
+          <p:cNvPr id="5" name="Fußzeilenplatzhalter 4">
+            <a:extLst>
+              <a:ext uri="{FF2B5EF4-FFF2-40B4-BE49-F238E27FC236}">
+                <a16:creationId xmlns:a16="http://schemas.microsoft.com/office/drawing/2014/main" id="{6C40129A-58DE-42E1-88E4-0DC49D8D3FAF}"/>
+              </a:ext>
+            </a:extLst>
+          </p:cNvPr>
+          <p:cNvSpPr>
+            <a:spLocks noGrp="1"/>
+          </p:cNvSpPr>
+          <p:nvPr>
+            <p:ph type="ftr" sz="quarter" idx="12"/>
+          </p:nvPr>
+        </p:nvSpPr>
+        <p:spPr/>
+        <p:txBody>
+          <a:bodyPr/>
+          <a:lstStyle/>
+          <a:p>
+            <a:r>
+              <a:rPr lang="de-DE"/>
+              <a:t>Sonja Stefani | Visualisierung von vernetztem Wissen als Graph im virtuellen Raum</a:t>
+            </a:r>
+            <a:endParaRPr lang="en-US" dirty="0"/>
+          </a:p>
+        </p:txBody>
+      </p:sp>
+    </p:spTree>
+    <p:extLst>
+      <p:ext uri="{BB962C8B-B14F-4D97-AF65-F5344CB8AC3E}">
+        <p14:creationId xmlns:p14="http://schemas.microsoft.com/office/powerpoint/2010/main" val="2240636036"/>
+      </p:ext>
+    </p:extLst>
+  </p:cSld>
+  <p:clrMapOvr>
+    <a:masterClrMapping/>
+  </p:clrMapOvr>
+</p:sld>
+</file>
+
+<file path=ppt/slides/slide14.xml><?xml version="1.0" encoding="utf-8"?>
+<p:sld xmlns:a="http://schemas.openxmlformats.org/drawingml/2006/main" xmlns:r="http://schemas.openxmlformats.org/officeDocument/2006/relationships" xmlns:p="http://schemas.openxmlformats.org/presentationml/2006/main">
+  <p:cSld>
+    <p:spTree>
+      <p:nvGrpSpPr>
+        <p:cNvPr id="1" name=""/>
+        <p:cNvGrpSpPr/>
+        <p:nvPr/>
+      </p:nvGrpSpPr>
+      <p:grpSpPr>
+        <a:xfrm>
+          <a:off x="0" y="0"/>
+          <a:ext cx="0" cy="0"/>
+          <a:chOff x="0" y="0"/>
+          <a:chExt cx="0" cy="0"/>
+        </a:xfrm>
+      </p:grpSpPr>
+      <p:sp>
+        <p:nvSpPr>
+          <p:cNvPr id="2" name="Inhaltsplatzhalter 1">
+            <a:extLst>
+              <a:ext uri="{FF2B5EF4-FFF2-40B4-BE49-F238E27FC236}">
+                <a16:creationId xmlns:a16="http://schemas.microsoft.com/office/drawing/2014/main" id="{93AE3B57-6D58-4738-9C50-4733B02344F8}"/>
+              </a:ext>
+            </a:extLst>
+          </p:cNvPr>
+          <p:cNvSpPr>
+            <a:spLocks noGrp="1"/>
+          </p:cNvSpPr>
+          <p:nvPr>
+            <p:ph idx="1"/>
+          </p:nvPr>
+        </p:nvSpPr>
+        <p:spPr/>
+        <p:txBody>
+          <a:bodyPr/>
+          <a:lstStyle/>
+          <a:p>
+            <a:r>
+              <a:rPr lang="de-DE" dirty="0"/>
+              <a:t>Konstruktion von Wissen</a:t>
+            </a:r>
+          </a:p>
+          <a:p>
+            <a:endParaRPr lang="de-DE" dirty="0"/>
+          </a:p>
+          <a:p>
+            <a:r>
+              <a:rPr lang="de-DE" dirty="0"/>
+              <a:t>Wissen wird nicht von außerhalb vermittelt</a:t>
+            </a:r>
+          </a:p>
+          <a:p>
+            <a:endParaRPr lang="de-DE" dirty="0"/>
+          </a:p>
+          <a:p>
+            <a:r>
+              <a:rPr lang="de-DE" dirty="0"/>
+              <a:t>Kritik an klassischem Erwerb von Wissen (z.B. Vortrag) [Gerstenmaier, Mandl, 1995]</a:t>
+            </a:r>
+          </a:p>
+          <a:p>
+            <a:endParaRPr lang="de-DE" dirty="0"/>
+          </a:p>
+          <a:p>
+            <a:r>
+              <a:rPr lang="de-DE" dirty="0"/>
+              <a:t>Aktive Beteiligung des Lernenden [Dubs, 1995]</a:t>
+            </a:r>
+          </a:p>
+        </p:txBody>
+      </p:sp>
+      <p:sp>
+        <p:nvSpPr>
+          <p:cNvPr id="3" name="Titel 2">
+            <a:extLst>
+              <a:ext uri="{FF2B5EF4-FFF2-40B4-BE49-F238E27FC236}">
+                <a16:creationId xmlns:a16="http://schemas.microsoft.com/office/drawing/2014/main" id="{79EE7A6F-334E-446E-B912-363D0A1A195D}"/>
+              </a:ext>
+            </a:extLst>
+          </p:cNvPr>
+          <p:cNvSpPr>
+            <a:spLocks noGrp="1"/>
+          </p:cNvSpPr>
+          <p:nvPr>
+            <p:ph type="title"/>
+          </p:nvPr>
+        </p:nvSpPr>
+        <p:spPr>
+          <a:xfrm>
+            <a:off x="319090" y="972000"/>
+            <a:ext cx="8508999" cy="410369"/>
+          </a:xfrm>
+        </p:spPr>
+        <p:txBody>
+          <a:bodyPr/>
+          <a:lstStyle/>
+          <a:p>
+            <a:r>
+              <a:rPr lang="de-DE" dirty="0"/>
+              <a:t>Weiterführend – Konstruktivismus</a:t>
+            </a:r>
+          </a:p>
+        </p:txBody>
+      </p:sp>
+      <p:sp>
+        <p:nvSpPr>
+          <p:cNvPr id="4" name="Foliennummernplatzhalter 3">
+            <a:extLst>
+              <a:ext uri="{FF2B5EF4-FFF2-40B4-BE49-F238E27FC236}">
+                <a16:creationId xmlns:a16="http://schemas.microsoft.com/office/drawing/2014/main" id="{41AD9022-FD4E-4B01-944E-85D7D658E9C9}"/>
+              </a:ext>
+            </a:extLst>
+          </p:cNvPr>
+          <p:cNvSpPr>
+            <a:spLocks noGrp="1"/>
+          </p:cNvSpPr>
+          <p:nvPr>
+            <p:ph type="sldNum" sz="quarter" idx="11"/>
+          </p:nvPr>
+        </p:nvSpPr>
+        <p:spPr/>
+        <p:txBody>
+          <a:bodyPr/>
+          <a:lstStyle/>
+          <a:p>
+            <a:fld id="{CE58CB1E-F828-4F11-99E0-327109AF9DA4}" type="slidenum">
+              <a:rPr lang="de-DE" smtClean="0"/>
+              <a:pPr/>
+              <a:t>14</a:t>
+            </a:fld>
+            <a:endParaRPr lang="de-DE" dirty="0"/>
+          </a:p>
+        </p:txBody>
+      </p:sp>
+      <p:sp>
+        <p:nvSpPr>
+          <p:cNvPr id="5" name="Fußzeilenplatzhalter 4">
+            <a:extLst>
+              <a:ext uri="{FF2B5EF4-FFF2-40B4-BE49-F238E27FC236}">
+                <a16:creationId xmlns:a16="http://schemas.microsoft.com/office/drawing/2014/main" id="{AE54B2E9-586E-41FA-BB48-85C09573DD1B}"/>
+              </a:ext>
+            </a:extLst>
+          </p:cNvPr>
+          <p:cNvSpPr>
+            <a:spLocks noGrp="1"/>
+          </p:cNvSpPr>
+          <p:nvPr>
+            <p:ph type="ftr" sz="quarter" idx="12"/>
+          </p:nvPr>
+        </p:nvSpPr>
+        <p:spPr/>
+        <p:txBody>
+          <a:bodyPr/>
+          <a:lstStyle/>
+          <a:p>
+            <a:r>
+              <a:rPr lang="de-DE"/>
+              <a:t>Sonja Stefani | Visualisierung von vernetztem Wissen als Graph im virtuellen Raum</a:t>
+            </a:r>
+            <a:endParaRPr lang="en-US" dirty="0"/>
+          </a:p>
+        </p:txBody>
+      </p:sp>
+    </p:spTree>
+    <p:extLst>
+      <p:ext uri="{BB962C8B-B14F-4D97-AF65-F5344CB8AC3E}">
+        <p14:creationId xmlns:p14="http://schemas.microsoft.com/office/powerpoint/2010/main" val="1661980879"/>
+      </p:ext>
+    </p:extLst>
+  </p:cSld>
+  <p:clrMapOvr>
+    <a:masterClrMapping/>
+  </p:clrMapOvr>
+</p:sld>
+</file>
+
+<file path=ppt/slides/slide15.xml><?xml version="1.0" encoding="utf-8"?>
+<p:sld xmlns:a="http://schemas.openxmlformats.org/drawingml/2006/main" xmlns:r="http://schemas.openxmlformats.org/officeDocument/2006/relationships" xmlns:p="http://schemas.openxmlformats.org/presentationml/2006/main">
+  <p:cSld>
+    <p:spTree>
+      <p:nvGrpSpPr>
+        <p:cNvPr id="1" name=""/>
+        <p:cNvGrpSpPr/>
+        <p:nvPr/>
+      </p:nvGrpSpPr>
+      <p:grpSpPr>
+        <a:xfrm>
+          <a:off x="0" y="0"/>
+          <a:ext cx="0" cy="0"/>
+          <a:chOff x="0" y="0"/>
+          <a:chExt cx="0" cy="0"/>
+        </a:xfrm>
+      </p:grpSpPr>
+      <p:sp>
+        <p:nvSpPr>
+          <p:cNvPr id="2" name="Inhaltsplatzhalter 1">
+            <a:extLst>
+              <a:ext uri="{FF2B5EF4-FFF2-40B4-BE49-F238E27FC236}">
+                <a16:creationId xmlns:a16="http://schemas.microsoft.com/office/drawing/2014/main" id="{E4E9B1E6-E6C0-40DC-A0A0-C6E2A64CD361}"/>
+              </a:ext>
+            </a:extLst>
+          </p:cNvPr>
+          <p:cNvSpPr>
+            <a:spLocks noGrp="1"/>
+          </p:cNvSpPr>
+          <p:nvPr>
+            <p:ph idx="14"/>
+          </p:nvPr>
+        </p:nvSpPr>
+        <p:spPr/>
+        <p:txBody>
+          <a:bodyPr/>
+          <a:lstStyle/>
+          <a:p>
+            <a:r>
+              <a:rPr lang="de-DE" dirty="0"/>
+              <a:t>Sehr hohe Zahl an Artikeln (2.150.336 enzyklopädische Artikel, 6.046.787 Seiten insgesamt)</a:t>
+            </a:r>
+          </a:p>
+          <a:p>
+            <a:endParaRPr lang="de-DE" dirty="0"/>
+          </a:p>
+          <a:p>
+            <a:r>
+              <a:rPr lang="de-DE" dirty="0"/>
+              <a:t>Hohe Anzahl an Verlinkungen (Beispiel: Artikel „Graph (Graphentheorie)“ mit 72 ausgehenden Links und 326 ankommenden Links, davon 26 ein- und ausgehend)</a:t>
+            </a:r>
+          </a:p>
+          <a:p>
+            <a:endParaRPr lang="de-DE" dirty="0"/>
+          </a:p>
+          <a:p>
+            <a:r>
+              <a:rPr lang="de-DE" dirty="0"/>
+              <a:t>Erreichen von irrelevanten Artikeln bereits bei geringer Entfernung vom Startknoten (Beispiel: Artikel „Graph (Graphentheorie)“ führt in zwei Schritten zu Artikel „Dampflokomotive“)</a:t>
+            </a:r>
+          </a:p>
+        </p:txBody>
+      </p:sp>
+      <p:pic>
+        <p:nvPicPr>
+          <p:cNvPr id="8" name="Inhaltsplatzhalter 7">
+            <a:extLst>
+              <a:ext uri="{FF2B5EF4-FFF2-40B4-BE49-F238E27FC236}">
+                <a16:creationId xmlns:a16="http://schemas.microsoft.com/office/drawing/2014/main" id="{EF1B316A-1641-4746-A8C3-2627F559CD2E}"/>
+              </a:ext>
+            </a:extLst>
+          </p:cNvPr>
+          <p:cNvPicPr>
+            <a:picLocks noGrp="1" noChangeAspect="1"/>
+          </p:cNvPicPr>
+          <p:nvPr>
+            <p:ph idx="15"/>
+          </p:nvPr>
+        </p:nvPicPr>
+        <p:blipFill>
+          <a:blip r:embed="rId2"/>
+          <a:stretch>
+            <a:fillRect/>
+          </a:stretch>
+        </p:blipFill>
+        <p:spPr>
+          <a:xfrm>
+            <a:off x="5545206" y="1590675"/>
+            <a:ext cx="2495468" cy="3239973"/>
+          </a:xfrm>
+        </p:spPr>
+      </p:pic>
+      <p:sp>
+        <p:nvSpPr>
+          <p:cNvPr id="3" name="Titel 2">
+            <a:extLst>
+              <a:ext uri="{FF2B5EF4-FFF2-40B4-BE49-F238E27FC236}">
+                <a16:creationId xmlns:a16="http://schemas.microsoft.com/office/drawing/2014/main" id="{6BCA0419-5FD1-41A8-95D1-4B4CA40BCDB4}"/>
+              </a:ext>
+            </a:extLst>
+          </p:cNvPr>
+          <p:cNvSpPr>
+            <a:spLocks noGrp="1"/>
+          </p:cNvSpPr>
+          <p:nvPr>
+            <p:ph type="title"/>
+          </p:nvPr>
+        </p:nvSpPr>
+        <p:spPr/>
+        <p:txBody>
+          <a:bodyPr/>
+          <a:lstStyle/>
+          <a:p>
+            <a:r>
+              <a:rPr lang="de-DE" dirty="0"/>
+              <a:t>Weiterführend – Wikipedia als Wissensnetzwerk</a:t>
+            </a:r>
+          </a:p>
+        </p:txBody>
+      </p:sp>
+      <p:sp>
+        <p:nvSpPr>
+          <p:cNvPr id="4" name="Foliennummernplatzhalter 3">
+            <a:extLst>
+              <a:ext uri="{FF2B5EF4-FFF2-40B4-BE49-F238E27FC236}">
+                <a16:creationId xmlns:a16="http://schemas.microsoft.com/office/drawing/2014/main" id="{D85BA44D-7CBF-43AD-A314-4B5C42E18842}"/>
+              </a:ext>
+            </a:extLst>
+          </p:cNvPr>
+          <p:cNvSpPr>
+            <a:spLocks noGrp="1"/>
+          </p:cNvSpPr>
+          <p:nvPr>
+            <p:ph type="sldNum" sz="quarter" idx="16"/>
+          </p:nvPr>
+        </p:nvSpPr>
+        <p:spPr/>
+        <p:txBody>
+          <a:bodyPr/>
+          <a:lstStyle/>
+          <a:p>
+            <a:fld id="{CE58CB1E-F828-4F11-99E0-327109AF9DA4}" type="slidenum">
+              <a:rPr lang="de-DE" smtClean="0"/>
+              <a:pPr/>
+              <a:t>15</a:t>
+            </a:fld>
+            <a:endParaRPr lang="de-DE" dirty="0"/>
+          </a:p>
+        </p:txBody>
+      </p:sp>
+      <p:sp>
+        <p:nvSpPr>
+          <p:cNvPr id="5" name="Fußzeilenplatzhalter 4">
+            <a:extLst>
+              <a:ext uri="{FF2B5EF4-FFF2-40B4-BE49-F238E27FC236}">
+                <a16:creationId xmlns:a16="http://schemas.microsoft.com/office/drawing/2014/main" id="{68BCF9AC-C324-4F30-BFFE-BC6A668C22C6}"/>
+              </a:ext>
+            </a:extLst>
+          </p:cNvPr>
+          <p:cNvSpPr>
+            <a:spLocks noGrp="1"/>
+          </p:cNvSpPr>
+          <p:nvPr>
+            <p:ph type="ftr" sz="quarter" idx="17"/>
+          </p:nvPr>
+        </p:nvSpPr>
+        <p:spPr/>
+        <p:txBody>
+          <a:bodyPr/>
+          <a:lstStyle/>
+          <a:p>
+            <a:r>
+              <a:rPr lang="de-DE"/>
+              <a:t>Sonja Stefani | Visualisierung von vernetztem Wissen als Graph im virtuellen Raum</a:t>
+            </a:r>
+            <a:endParaRPr lang="en-US" dirty="0"/>
+          </a:p>
+        </p:txBody>
+      </p:sp>
+    </p:spTree>
+    <p:extLst>
+      <p:ext uri="{BB962C8B-B14F-4D97-AF65-F5344CB8AC3E}">
+        <p14:creationId xmlns:p14="http://schemas.microsoft.com/office/powerpoint/2010/main" val="66698534"/>
+      </p:ext>
+    </p:extLst>
+  </p:cSld>
+  <p:clrMapOvr>
+    <a:masterClrMapping/>
+  </p:clrMapOvr>
+</p:sld>
+</file>
+
+<file path=ppt/slides/slide16.xml><?xml version="1.0" encoding="utf-8"?>
+<p:sld xmlns:a="http://schemas.openxmlformats.org/drawingml/2006/main" xmlns:r="http://schemas.openxmlformats.org/officeDocument/2006/relationships" xmlns:p="http://schemas.openxmlformats.org/presentationml/2006/main">
+  <p:cSld>
+    <p:spTree>
+      <p:nvGrpSpPr>
+        <p:cNvPr id="1" name=""/>
+        <p:cNvGrpSpPr/>
+        <p:nvPr/>
+      </p:nvGrpSpPr>
+      <p:grpSpPr>
+        <a:xfrm>
+          <a:off x="0" y="0"/>
+          <a:ext cx="0" cy="0"/>
+          <a:chOff x="0" y="0"/>
+          <a:chExt cx="0" cy="0"/>
+        </a:xfrm>
+      </p:grpSpPr>
+      <p:sp>
+        <p:nvSpPr>
+          <p:cNvPr id="4" name="Titel 3">
+            <a:extLst>
+              <a:ext uri="{FF2B5EF4-FFF2-40B4-BE49-F238E27FC236}">
+                <a16:creationId xmlns:a16="http://schemas.microsoft.com/office/drawing/2014/main" id="{3806C71D-769B-447C-A69C-A777F0B3246C}"/>
+              </a:ext>
+            </a:extLst>
+          </p:cNvPr>
+          <p:cNvSpPr>
+            <a:spLocks noGrp="1"/>
+          </p:cNvSpPr>
+          <p:nvPr>
+            <p:ph type="title"/>
+          </p:nvPr>
+        </p:nvSpPr>
+        <p:spPr/>
+        <p:txBody>
+          <a:bodyPr/>
+          <a:lstStyle/>
+          <a:p>
+            <a:r>
+              <a:rPr lang="de-DE" dirty="0"/>
+              <a:t>Weiterführend – </a:t>
+            </a:r>
+            <a:r>
+              <a:rPr lang="de-DE" dirty="0" err="1"/>
+              <a:t>Fruchterman</a:t>
+            </a:r>
+            <a:r>
+              <a:rPr lang="de-DE" dirty="0"/>
+              <a:t> </a:t>
+            </a:r>
+            <a:r>
+              <a:rPr lang="de-DE" dirty="0" err="1"/>
+              <a:t>Reingold</a:t>
+            </a:r>
+            <a:endParaRPr lang="de-DE" dirty="0"/>
+          </a:p>
+        </p:txBody>
+      </p:sp>
+      <p:sp>
+        <p:nvSpPr>
+          <p:cNvPr id="5" name="Foliennummernplatzhalter 4">
+            <a:extLst>
+              <a:ext uri="{FF2B5EF4-FFF2-40B4-BE49-F238E27FC236}">
+                <a16:creationId xmlns:a16="http://schemas.microsoft.com/office/drawing/2014/main" id="{7549E9B4-ED86-47AC-9A4B-6964BA0BDAE5}"/>
+              </a:ext>
+            </a:extLst>
+          </p:cNvPr>
+          <p:cNvSpPr>
+            <a:spLocks noGrp="1"/>
+          </p:cNvSpPr>
+          <p:nvPr>
+            <p:ph type="sldNum" sz="quarter" idx="16"/>
+          </p:nvPr>
+        </p:nvSpPr>
+        <p:spPr/>
+        <p:txBody>
+          <a:bodyPr/>
+          <a:lstStyle/>
+          <a:p>
+            <a:fld id="{CE58CB1E-F828-4F11-99E0-327109AF9DA4}" type="slidenum">
+              <a:rPr lang="de-DE" smtClean="0"/>
+              <a:pPr/>
+              <a:t>16</a:t>
+            </a:fld>
+            <a:endParaRPr lang="de-DE" dirty="0"/>
+          </a:p>
+        </p:txBody>
+      </p:sp>
+      <p:sp>
+        <p:nvSpPr>
+          <p:cNvPr id="6" name="Fußzeilenplatzhalter 5">
+            <a:extLst>
+              <a:ext uri="{FF2B5EF4-FFF2-40B4-BE49-F238E27FC236}">
+                <a16:creationId xmlns:a16="http://schemas.microsoft.com/office/drawing/2014/main" id="{1CF91D5B-1307-4EDF-8089-09B501C8E79B}"/>
+              </a:ext>
+            </a:extLst>
+          </p:cNvPr>
+          <p:cNvSpPr>
+            <a:spLocks noGrp="1"/>
+          </p:cNvSpPr>
+          <p:nvPr>
+            <p:ph type="ftr" sz="quarter" idx="17"/>
+          </p:nvPr>
+        </p:nvSpPr>
+        <p:spPr/>
+        <p:txBody>
+          <a:bodyPr/>
+          <a:lstStyle/>
+          <a:p>
+            <a:r>
+              <a:rPr lang="de-DE"/>
+              <a:t>Sonja Stefani | Visualisierung von vernetztem Wissen als Graph im virtuellen Raum</a:t>
+            </a:r>
+            <a:endParaRPr lang="en-US" dirty="0"/>
+          </a:p>
+        </p:txBody>
+      </p:sp>
+      <p:pic>
+        <p:nvPicPr>
+          <p:cNvPr id="23" name="Inhaltsplatzhalter 22">
+            <a:extLst>
+              <a:ext uri="{FF2B5EF4-FFF2-40B4-BE49-F238E27FC236}">
+                <a16:creationId xmlns:a16="http://schemas.microsoft.com/office/drawing/2014/main" id="{86F9186B-5906-4131-9C77-465D75469F7F}"/>
+              </a:ext>
+            </a:extLst>
+          </p:cNvPr>
+          <p:cNvPicPr>
+            <a:picLocks noGrp="1" noChangeAspect="1"/>
+          </p:cNvPicPr>
+          <p:nvPr>
+            <p:ph idx="14"/>
+          </p:nvPr>
+        </p:nvPicPr>
+        <p:blipFill>
+          <a:blip r:embed="rId2"/>
+          <a:stretch>
+            <a:fillRect/>
+          </a:stretch>
+        </p:blipFill>
+        <p:spPr>
+          <a:xfrm>
+            <a:off x="319088" y="1905208"/>
+            <a:ext cx="4181475" cy="2466559"/>
+          </a:xfrm>
+        </p:spPr>
+      </p:pic>
+      <p:pic>
+        <p:nvPicPr>
+          <p:cNvPr id="25" name="Inhaltsplatzhalter 24">
+            <a:extLst>
+              <a:ext uri="{FF2B5EF4-FFF2-40B4-BE49-F238E27FC236}">
+                <a16:creationId xmlns:a16="http://schemas.microsoft.com/office/drawing/2014/main" id="{555D021E-1A85-471D-AF13-D37323F87228}"/>
+              </a:ext>
+            </a:extLst>
+          </p:cNvPr>
+          <p:cNvPicPr>
+            <a:picLocks noGrp="1" noChangeAspect="1"/>
+          </p:cNvPicPr>
+          <p:nvPr>
+            <p:ph idx="15"/>
+          </p:nvPr>
+        </p:nvPicPr>
+        <p:blipFill>
+          <a:blip r:embed="rId3"/>
+          <a:stretch>
+            <a:fillRect/>
+          </a:stretch>
+        </p:blipFill>
+        <p:spPr>
+          <a:xfrm>
+            <a:off x="4646613" y="1868720"/>
+            <a:ext cx="4181475" cy="2539534"/>
+          </a:xfrm>
+        </p:spPr>
+      </p:pic>
+    </p:spTree>
+    <p:extLst>
+      <p:ext uri="{BB962C8B-B14F-4D97-AF65-F5344CB8AC3E}">
+        <p14:creationId xmlns:p14="http://schemas.microsoft.com/office/powerpoint/2010/main" val="3483783928"/>
+      </p:ext>
+    </p:extLst>
+  </p:cSld>
+  <p:clrMapOvr>
+    <a:masterClrMapping/>
+  </p:clrMapOvr>
+</p:sld>
+</file>
+
+<file path=ppt/slides/slide17.xml><?xml version="1.0" encoding="utf-8"?>
+<p:sld xmlns:a="http://schemas.openxmlformats.org/drawingml/2006/main" xmlns:r="http://schemas.openxmlformats.org/officeDocument/2006/relationships" xmlns:p="http://schemas.openxmlformats.org/presentationml/2006/main">
+  <p:cSld>
+    <p:spTree>
+      <p:nvGrpSpPr>
+        <p:cNvPr id="1" name=""/>
+        <p:cNvGrpSpPr/>
+        <p:nvPr/>
+      </p:nvGrpSpPr>
+      <p:grpSpPr>
+        <a:xfrm>
+          <a:off x="0" y="0"/>
+          <a:ext cx="0" cy="0"/>
+          <a:chOff x="0" y="0"/>
+          <a:chExt cx="0" cy="0"/>
+        </a:xfrm>
+      </p:grpSpPr>
+      <mc:AlternateContent xmlns:mc="http://schemas.openxmlformats.org/markup-compatibility/2006">
+        <mc:Choice xmlns:a14="http://schemas.microsoft.com/office/drawing/2010/main" Requires="a14">
+          <p:sp>
+            <p:nvSpPr>
+              <p:cNvPr id="7" name="Inhaltsplatzhalter 6">
+                <a:extLst>
+                  <a:ext uri="{FF2B5EF4-FFF2-40B4-BE49-F238E27FC236}">
+                    <a16:creationId xmlns:a16="http://schemas.microsoft.com/office/drawing/2014/main" id="{C2EB68A5-775B-46EE-AF9D-B45933EE7A72}"/>
+                  </a:ext>
+                </a:extLst>
+              </p:cNvPr>
+              <p:cNvSpPr>
+                <a:spLocks noGrp="1"/>
+              </p:cNvSpPr>
+              <p:nvPr>
+                <p:ph idx="1"/>
+              </p:nvPr>
+            </p:nvSpPr>
+            <p:spPr/>
+            <p:txBody>
+              <a:bodyPr/>
+              <a:lstStyle/>
+              <a:p>
+                <a:r>
+                  <a:rPr lang="de-DE" dirty="0"/>
+                  <a:t>Notwendigkeit von Anpassungen zur Visualisierung von Graphen in 3D</a:t>
+                </a:r>
+              </a:p>
+              <a:p>
+                <a:pPr marL="285750" indent="-285750">
+                  <a:buFont typeface="Arial" panose="020B0604020202020204" pitchFamily="34" charset="0"/>
+                  <a:buChar char="•"/>
+                </a:pPr>
+                <a14:m>
+                  <m:oMath xmlns:m="http://schemas.openxmlformats.org/officeDocument/2006/math">
+                    <m:r>
+                      <a:rPr lang="de-DE" b="0" i="1" dirty="0" smtClean="0">
+                        <a:latin typeface="Cambria Math" panose="02040503050406030204" pitchFamily="18" charset="0"/>
+                      </a:rPr>
+                      <m:t>𝑎</m:t>
+                    </m:r>
+                    <m:r>
+                      <a:rPr lang="de-DE" i="1" dirty="0" smtClean="0">
+                        <a:latin typeface="Cambria Math" panose="02040503050406030204" pitchFamily="18" charset="0"/>
+                      </a:rPr>
+                      <m:t>𝑟𝑒𝑎</m:t>
+                    </m:r>
+                    <m:r>
+                      <a:rPr lang="de-DE" i="1" dirty="0" smtClean="0">
+                        <a:latin typeface="Cambria Math" panose="02040503050406030204" pitchFamily="18" charset="0"/>
+                      </a:rPr>
+                      <m:t> := </m:t>
+                    </m:r>
+                    <m:r>
+                      <a:rPr lang="de-DE" i="1" dirty="0" smtClean="0">
+                        <a:latin typeface="Cambria Math" panose="02040503050406030204" pitchFamily="18" charset="0"/>
+                      </a:rPr>
+                      <m:t>𝑊</m:t>
+                    </m:r>
+                    <m:r>
+                      <a:rPr lang="de-DE" i="1" dirty="0">
+                        <a:latin typeface="Cambria Math" panose="02040503050406030204" pitchFamily="18" charset="0"/>
+                      </a:rPr>
+                      <m:t> </m:t>
+                    </m:r>
+                    <m:r>
+                      <a:rPr lang="de-DE" i="1" dirty="0" smtClean="0">
+                        <a:latin typeface="Cambria Math" panose="02040503050406030204" pitchFamily="18" charset="0"/>
+                      </a:rPr>
+                      <m:t>∗</m:t>
+                    </m:r>
+                    <m:r>
+                      <a:rPr lang="de-DE" i="1" dirty="0">
+                        <a:latin typeface="Cambria Math" panose="02040503050406030204" pitchFamily="18" charset="0"/>
+                      </a:rPr>
+                      <m:t> </m:t>
+                    </m:r>
+                    <m:r>
+                      <a:rPr lang="de-DE" i="1" dirty="0" smtClean="0">
+                        <a:latin typeface="Cambria Math" panose="02040503050406030204" pitchFamily="18" charset="0"/>
+                      </a:rPr>
+                      <m:t>𝐿</m:t>
+                    </m:r>
+                    <m:r>
+                      <a:rPr lang="de-DE" i="1" dirty="0">
+                        <a:latin typeface="Cambria Math" panose="02040503050406030204" pitchFamily="18" charset="0"/>
+                      </a:rPr>
+                      <m:t> </m:t>
+                    </m:r>
+                    <m:r>
+                      <a:rPr lang="de-DE" i="1" dirty="0" smtClean="0">
+                        <a:latin typeface="Cambria Math" panose="02040503050406030204" pitchFamily="18" charset="0"/>
+                      </a:rPr>
+                      <m:t>∗ </m:t>
+                    </m:r>
+                    <m:r>
+                      <a:rPr lang="de-DE" i="1" dirty="0" smtClean="0">
+                        <a:latin typeface="Cambria Math" panose="02040503050406030204" pitchFamily="18" charset="0"/>
+                      </a:rPr>
+                      <m:t>𝐻</m:t>
+                    </m:r>
+                  </m:oMath>
+                </a14:m>
+                <a:endParaRPr lang="de-DE" dirty="0"/>
+              </a:p>
+              <a:p>
+                <a:pPr marL="285750" indent="-285750">
+                  <a:buFont typeface="Arial" panose="020B0604020202020204" pitchFamily="34" charset="0"/>
+                  <a:buChar char="•"/>
+                </a:pPr>
+                <a14:m>
+                  <m:oMath xmlns:m="http://schemas.openxmlformats.org/officeDocument/2006/math">
+                    <m:r>
+                      <a:rPr lang="de-DE" b="0" i="1" smtClean="0">
+                        <a:latin typeface="Cambria Math" panose="02040503050406030204" pitchFamily="18" charset="0"/>
+                      </a:rPr>
+                      <m:t>𝑘</m:t>
+                    </m:r>
+                    <m:r>
+                      <a:rPr lang="de-DE" b="0" i="1" smtClean="0">
+                        <a:latin typeface="Cambria Math" panose="02040503050406030204" pitchFamily="18" charset="0"/>
+                      </a:rPr>
+                      <m:t>≔ </m:t>
+                    </m:r>
+                    <m:rad>
+                      <m:radPr>
+                        <m:ctrlPr>
+                          <a:rPr lang="de-DE" b="0" i="1" smtClean="0">
+                            <a:latin typeface="Cambria Math" panose="02040503050406030204" pitchFamily="18" charset="0"/>
+                          </a:rPr>
+                        </m:ctrlPr>
+                      </m:radPr>
+                      <m:deg>
+                        <m:r>
+                          <m:rPr>
+                            <m:brk m:alnAt="7"/>
+                          </m:rPr>
+                          <a:rPr lang="de-DE" b="0" i="1" smtClean="0">
+                            <a:latin typeface="Cambria Math" panose="02040503050406030204" pitchFamily="18" charset="0"/>
+                          </a:rPr>
+                          <m:t>3</m:t>
+                        </m:r>
+                      </m:deg>
+                      <m:e>
+                        <m:r>
+                          <a:rPr lang="de-DE" b="0" i="1" smtClean="0">
+                            <a:latin typeface="Cambria Math" panose="02040503050406030204" pitchFamily="18" charset="0"/>
+                          </a:rPr>
+                          <m:t>𝑎𝑟𝑒𝑎</m:t>
+                        </m:r>
+                        <m:r>
+                          <a:rPr lang="de-DE" b="0" i="1" smtClean="0">
+                            <a:latin typeface="Cambria Math" panose="02040503050406030204" pitchFamily="18" charset="0"/>
+                          </a:rPr>
+                          <m:t>/|</m:t>
+                        </m:r>
+                        <m:r>
+                          <a:rPr lang="de-DE" b="0" i="1" smtClean="0">
+                            <a:latin typeface="Cambria Math" panose="02040503050406030204" pitchFamily="18" charset="0"/>
+                          </a:rPr>
+                          <m:t>𝑉</m:t>
+                        </m:r>
+                        <m:r>
+                          <a:rPr lang="de-DE" b="0" i="1" smtClean="0">
+                            <a:latin typeface="Cambria Math" panose="02040503050406030204" pitchFamily="18" charset="0"/>
+                          </a:rPr>
+                          <m:t>|</m:t>
+                        </m:r>
+                      </m:e>
+                    </m:rad>
+                  </m:oMath>
+                </a14:m>
+                <a:endParaRPr lang="de-DE" dirty="0"/>
+              </a:p>
+              <a:p>
+                <a:pPr marL="285750" indent="-285750">
+                  <a:buFont typeface="Arial" panose="020B0604020202020204" pitchFamily="34" charset="0"/>
+                  <a:buChar char="•"/>
+                </a:pPr>
+                <a14:m>
+                  <m:oMath xmlns:m="http://schemas.openxmlformats.org/officeDocument/2006/math">
+                    <m:r>
+                      <a:rPr lang="de-DE" b="0" i="1" dirty="0" smtClean="0">
+                        <a:latin typeface="Cambria Math" panose="02040503050406030204" pitchFamily="18" charset="0"/>
+                      </a:rPr>
+                      <m:t>𝑣</m:t>
+                    </m:r>
+                    <m:r>
+                      <a:rPr lang="de-DE" i="1" dirty="0" smtClean="0">
+                        <a:latin typeface="Cambria Math" panose="02040503050406030204" pitchFamily="18" charset="0"/>
+                      </a:rPr>
+                      <m:t>.</m:t>
+                    </m:r>
+                    <m:r>
+                      <a:rPr lang="de-DE" i="1" dirty="0" smtClean="0">
+                        <a:latin typeface="Cambria Math" panose="02040503050406030204" pitchFamily="18" charset="0"/>
+                      </a:rPr>
+                      <m:t>𝑝𝑜𝑠</m:t>
+                    </m:r>
+                    <m:r>
+                      <a:rPr lang="de-DE" i="1" dirty="0" smtClean="0">
+                        <a:latin typeface="Cambria Math" panose="02040503050406030204" pitchFamily="18" charset="0"/>
+                      </a:rPr>
+                      <m:t>.</m:t>
+                    </m:r>
+                    <m:r>
+                      <a:rPr lang="de-DE" i="1" dirty="0" smtClean="0">
+                        <a:latin typeface="Cambria Math" panose="02040503050406030204" pitchFamily="18" charset="0"/>
+                      </a:rPr>
+                      <m:t>𝑧</m:t>
+                    </m:r>
+                    <m:r>
+                      <a:rPr lang="de-DE" i="1" dirty="0" smtClean="0">
+                        <a:latin typeface="Cambria Math" panose="02040503050406030204" pitchFamily="18" charset="0"/>
+                      </a:rPr>
+                      <m:t> ≔</m:t>
+                    </m:r>
+                    <m:func>
+                      <m:funcPr>
+                        <m:ctrlPr>
+                          <a:rPr lang="de-DE" b="0" i="1" dirty="0" smtClean="0">
+                            <a:latin typeface="Cambria Math" panose="02040503050406030204" pitchFamily="18" charset="0"/>
+                          </a:rPr>
+                        </m:ctrlPr>
+                      </m:funcPr>
+                      <m:fName>
+                        <m:r>
+                          <m:rPr>
+                            <m:sty m:val="p"/>
+                          </m:rPr>
+                          <a:rPr lang="de-DE" b="0" i="0" dirty="0" smtClean="0">
+                            <a:latin typeface="Cambria Math" panose="02040503050406030204" pitchFamily="18" charset="0"/>
+                          </a:rPr>
+                          <m:t>min</m:t>
+                        </m:r>
+                      </m:fName>
+                      <m:e>
+                        <m:d>
+                          <m:dPr>
+                            <m:ctrlPr>
+                              <a:rPr lang="de-DE" b="0" i="1" dirty="0" smtClean="0">
+                                <a:latin typeface="Cambria Math" panose="02040503050406030204" pitchFamily="18" charset="0"/>
+                              </a:rPr>
+                            </m:ctrlPr>
+                          </m:dPr>
+                          <m:e>
+                            <m:f>
+                              <m:fPr>
+                                <m:ctrlPr>
+                                  <a:rPr lang="de-DE" b="0" i="1" dirty="0" smtClean="0">
+                                    <a:latin typeface="Cambria Math" panose="02040503050406030204" pitchFamily="18" charset="0"/>
+                                  </a:rPr>
+                                </m:ctrlPr>
+                              </m:fPr>
+                              <m:num>
+                                <m:r>
+                                  <a:rPr lang="de-DE" b="0" i="1" dirty="0" smtClean="0">
+                                    <a:latin typeface="Cambria Math" panose="02040503050406030204" pitchFamily="18" charset="0"/>
+                                  </a:rPr>
+                                  <m:t>𝐻</m:t>
+                                </m:r>
+                              </m:num>
+                              <m:den>
+                                <m:r>
+                                  <a:rPr lang="de-DE" b="0" i="1" dirty="0" smtClean="0">
+                                    <a:latin typeface="Cambria Math" panose="02040503050406030204" pitchFamily="18" charset="0"/>
+                                  </a:rPr>
+                                  <m:t>2</m:t>
+                                </m:r>
+                              </m:den>
+                            </m:f>
+                            <m:r>
+                              <a:rPr lang="de-DE" b="0" i="1" dirty="0" smtClean="0">
+                                <a:latin typeface="Cambria Math" panose="02040503050406030204" pitchFamily="18" charset="0"/>
+                              </a:rPr>
+                              <m:t>, </m:t>
+                            </m:r>
+                            <m:r>
+                              <m:rPr>
+                                <m:sty m:val="p"/>
+                              </m:rPr>
+                              <a:rPr lang="de-DE" b="0" i="0" dirty="0" smtClean="0">
+                                <a:latin typeface="Cambria Math" panose="02040503050406030204" pitchFamily="18" charset="0"/>
+                              </a:rPr>
+                              <m:t>max</m:t>
+                            </m:r>
+                            <m:r>
+                              <a:rPr lang="de-DE" b="0" i="1" dirty="0" smtClean="0">
+                                <a:latin typeface="Cambria Math" panose="02040503050406030204" pitchFamily="18" charset="0"/>
+                              </a:rPr>
+                              <m:t>⁡(−</m:t>
+                            </m:r>
+                            <m:f>
+                              <m:fPr>
+                                <m:ctrlPr>
+                                  <a:rPr lang="de-DE" b="0" i="1" dirty="0" smtClean="0">
+                                    <a:latin typeface="Cambria Math" panose="02040503050406030204" pitchFamily="18" charset="0"/>
+                                  </a:rPr>
+                                </m:ctrlPr>
+                              </m:fPr>
+                              <m:num>
+                                <m:r>
+                                  <a:rPr lang="de-DE" b="0" i="1" dirty="0" smtClean="0">
+                                    <a:latin typeface="Cambria Math" panose="02040503050406030204" pitchFamily="18" charset="0"/>
+                                  </a:rPr>
+                                  <m:t>𝐻</m:t>
+                                </m:r>
+                              </m:num>
+                              <m:den>
+                                <m:r>
+                                  <a:rPr lang="de-DE" b="0" i="1" dirty="0" smtClean="0">
+                                    <a:latin typeface="Cambria Math" panose="02040503050406030204" pitchFamily="18" charset="0"/>
+                                  </a:rPr>
+                                  <m:t>2</m:t>
+                                </m:r>
+                              </m:den>
+                            </m:f>
+                            <m:r>
+                              <a:rPr lang="de-DE" b="0" i="1" dirty="0" smtClean="0">
+                                <a:latin typeface="Cambria Math" panose="02040503050406030204" pitchFamily="18" charset="0"/>
+                              </a:rPr>
+                              <m:t>, </m:t>
+                            </m:r>
+                            <m:r>
+                              <a:rPr lang="de-DE" b="0" i="1" dirty="0" smtClean="0">
+                                <a:latin typeface="Cambria Math" panose="02040503050406030204" pitchFamily="18" charset="0"/>
+                              </a:rPr>
+                              <m:t>𝑣</m:t>
+                            </m:r>
+                            <m:r>
+                              <a:rPr lang="de-DE" b="0" i="1" dirty="0" smtClean="0">
+                                <a:latin typeface="Cambria Math" panose="02040503050406030204" pitchFamily="18" charset="0"/>
+                              </a:rPr>
+                              <m:t>.</m:t>
+                            </m:r>
+                            <m:r>
+                              <a:rPr lang="de-DE" b="0" i="1" dirty="0" smtClean="0">
+                                <a:latin typeface="Cambria Math" panose="02040503050406030204" pitchFamily="18" charset="0"/>
+                              </a:rPr>
+                              <m:t>𝑝𝑜𝑠</m:t>
+                            </m:r>
+                            <m:r>
+                              <a:rPr lang="de-DE" b="0" i="1" dirty="0" smtClean="0">
+                                <a:latin typeface="Cambria Math" panose="02040503050406030204" pitchFamily="18" charset="0"/>
+                              </a:rPr>
+                              <m:t>.</m:t>
+                            </m:r>
+                            <m:r>
+                              <a:rPr lang="de-DE" b="0" i="1" dirty="0" smtClean="0">
+                                <a:latin typeface="Cambria Math" panose="02040503050406030204" pitchFamily="18" charset="0"/>
+                              </a:rPr>
+                              <m:t>𝑧</m:t>
+                            </m:r>
+                            <m:r>
+                              <a:rPr lang="de-DE" b="0" i="1" dirty="0" smtClean="0">
+                                <a:latin typeface="Cambria Math" panose="02040503050406030204" pitchFamily="18" charset="0"/>
+                              </a:rPr>
+                              <m:t>)</m:t>
+                            </m:r>
+                          </m:e>
+                        </m:d>
+                      </m:e>
+                    </m:func>
+                  </m:oMath>
+                </a14:m>
+                <a:endParaRPr lang="de-DE" dirty="0"/>
+              </a:p>
+              <a:p>
+                <a:pPr marL="285750" indent="-285750">
+                  <a:buFont typeface="Arial" panose="020B0604020202020204" pitchFamily="34" charset="0"/>
+                  <a:buChar char="•"/>
+                </a:pPr>
+                <a:endParaRPr lang="de-DE" dirty="0"/>
+              </a:p>
+              <a:p>
+                <a:r>
+                  <a:rPr lang="de-DE" dirty="0"/>
+                  <a:t>Abkühlen der Knoten bei mehrfacher Iteration durch die Funktion „cool(t)“</a:t>
+                </a:r>
+              </a:p>
+              <a:p>
+                <a:pPr marL="285750" indent="-285750">
+                  <a:buFont typeface="Arial" panose="020B0604020202020204" pitchFamily="34" charset="0"/>
+                  <a:buChar char="•"/>
+                </a:pPr>
+                <a:endParaRPr lang="de-DE" dirty="0"/>
+              </a:p>
+              <a:p>
+                <a:pPr marL="285750" indent="-285750">
+                  <a:buFont typeface="Arial" panose="020B0604020202020204" pitchFamily="34" charset="0"/>
+                  <a:buChar char="•"/>
+                </a:pPr>
+                <a:endParaRPr lang="de-DE" dirty="0"/>
+              </a:p>
+            </p:txBody>
+          </p:sp>
+        </mc:Choice>
+        <mc:Fallback>
+          <p:sp>
+            <p:nvSpPr>
+              <p:cNvPr id="7" name="Inhaltsplatzhalter 6">
+                <a:extLst>
+                  <a:ext uri="{FF2B5EF4-FFF2-40B4-BE49-F238E27FC236}">
+                    <a16:creationId xmlns:a16="http://schemas.microsoft.com/office/drawing/2014/main" id="{C2EB68A5-775B-46EE-AF9D-B45933EE7A72}"/>
+                  </a:ext>
+                </a:extLst>
+              </p:cNvPr>
+              <p:cNvSpPr>
+                <a:spLocks noGrp="1" noRot="1" noChangeAspect="1" noMove="1" noResize="1" noEditPoints="1" noAdjustHandles="1" noChangeArrowheads="1" noChangeShapeType="1" noTextEdit="1"/>
+              </p:cNvSpPr>
+              <p:nvPr>
+                <p:ph idx="1"/>
+              </p:nvPr>
+            </p:nvSpPr>
+            <p:spPr>
+              <a:blipFill>
+                <a:blip r:embed="rId2"/>
+                <a:stretch>
+                  <a:fillRect l="-1289" t="-1578"/>
+                </a:stretch>
+              </a:blipFill>
+            </p:spPr>
+            <p:txBody>
+              <a:bodyPr/>
+              <a:lstStyle/>
+              <a:p>
+                <a:r>
+                  <a:rPr lang="de-DE">
+                    <a:noFill/>
+                  </a:rPr>
+                  <a:t> </a:t>
+                </a:r>
+              </a:p>
+            </p:txBody>
+          </p:sp>
+        </mc:Fallback>
+      </mc:AlternateContent>
+      <p:sp>
+        <p:nvSpPr>
+          <p:cNvPr id="4" name="Titel 3">
+            <a:extLst>
+              <a:ext uri="{FF2B5EF4-FFF2-40B4-BE49-F238E27FC236}">
+                <a16:creationId xmlns:a16="http://schemas.microsoft.com/office/drawing/2014/main" id="{9B18F715-B05A-4EA0-AF17-A0311017C405}"/>
+              </a:ext>
+            </a:extLst>
+          </p:cNvPr>
+          <p:cNvSpPr>
+            <a:spLocks noGrp="1"/>
+          </p:cNvSpPr>
+          <p:nvPr>
+            <p:ph type="title"/>
+          </p:nvPr>
+        </p:nvSpPr>
+        <p:spPr/>
+        <p:txBody>
+          <a:bodyPr/>
+          <a:lstStyle/>
+          <a:p>
+            <a:r>
+              <a:rPr lang="de-DE" dirty="0"/>
+              <a:t>Weiterführend – </a:t>
+            </a:r>
+            <a:r>
+              <a:rPr lang="de-DE" dirty="0" err="1"/>
+              <a:t>Fruchterman</a:t>
+            </a:r>
+            <a:r>
+              <a:rPr lang="de-DE" dirty="0"/>
+              <a:t> </a:t>
+            </a:r>
+            <a:r>
+              <a:rPr lang="de-DE" dirty="0" err="1"/>
+              <a:t>Reingold</a:t>
+            </a:r>
+            <a:endParaRPr lang="de-DE" dirty="0"/>
+          </a:p>
+        </p:txBody>
+      </p:sp>
+      <p:sp>
+        <p:nvSpPr>
+          <p:cNvPr id="5" name="Foliennummernplatzhalter 4">
+            <a:extLst>
+              <a:ext uri="{FF2B5EF4-FFF2-40B4-BE49-F238E27FC236}">
+                <a16:creationId xmlns:a16="http://schemas.microsoft.com/office/drawing/2014/main" id="{C1714DBA-C105-4244-AC6D-94959317F777}"/>
+              </a:ext>
+            </a:extLst>
+          </p:cNvPr>
+          <p:cNvSpPr>
+            <a:spLocks noGrp="1"/>
+          </p:cNvSpPr>
+          <p:nvPr>
+            <p:ph type="sldNum" sz="quarter" idx="11"/>
+          </p:nvPr>
+        </p:nvSpPr>
+        <p:spPr/>
+        <p:txBody>
+          <a:bodyPr/>
+          <a:lstStyle/>
+          <a:p>
+            <a:fld id="{CE58CB1E-F828-4F11-99E0-327109AF9DA4}" type="slidenum">
+              <a:rPr lang="de-DE" smtClean="0"/>
+              <a:pPr/>
+              <a:t>17</a:t>
+            </a:fld>
+            <a:endParaRPr lang="de-DE" dirty="0"/>
+          </a:p>
+        </p:txBody>
+      </p:sp>
+      <p:sp>
+        <p:nvSpPr>
+          <p:cNvPr id="6" name="Fußzeilenplatzhalter 5">
+            <a:extLst>
+              <a:ext uri="{FF2B5EF4-FFF2-40B4-BE49-F238E27FC236}">
+                <a16:creationId xmlns:a16="http://schemas.microsoft.com/office/drawing/2014/main" id="{F287E71B-406B-419A-94E6-4585E7F12FE3}"/>
+              </a:ext>
+            </a:extLst>
+          </p:cNvPr>
+          <p:cNvSpPr>
+            <a:spLocks noGrp="1"/>
+          </p:cNvSpPr>
+          <p:nvPr>
+            <p:ph type="ftr" sz="quarter" idx="12"/>
+          </p:nvPr>
+        </p:nvSpPr>
+        <p:spPr/>
+        <p:txBody>
+          <a:bodyPr/>
+          <a:lstStyle/>
+          <a:p>
+            <a:r>
+              <a:rPr lang="de-DE"/>
+              <a:t>Sonja Stefani | Visualisierung von vernetztem Wissen als Graph im virtuellen Raum</a:t>
+            </a:r>
+            <a:endParaRPr lang="en-US" dirty="0"/>
+          </a:p>
+        </p:txBody>
+      </p:sp>
+    </p:spTree>
+    <p:extLst>
+      <p:ext uri="{BB962C8B-B14F-4D97-AF65-F5344CB8AC3E}">
+        <p14:creationId xmlns:p14="http://schemas.microsoft.com/office/powerpoint/2010/main" val="1962192087"/>
+      </p:ext>
+    </p:extLst>
+  </p:cSld>
+  <p:clrMapOvr>
+    <a:masterClrMapping/>
+  </p:clrMapOvr>
+</p:sld>
+</file>
+
+<file path=ppt/slides/slide18.xml><?xml version="1.0" encoding="utf-8"?>
+<p:sld xmlns:a="http://schemas.openxmlformats.org/drawingml/2006/main" xmlns:r="http://schemas.openxmlformats.org/officeDocument/2006/relationships" xmlns:p="http://schemas.openxmlformats.org/presentationml/2006/main">
+  <p:cSld>
+    <p:spTree>
+      <p:nvGrpSpPr>
+        <p:cNvPr id="1" name=""/>
+        <p:cNvGrpSpPr/>
+        <p:nvPr/>
+      </p:nvGrpSpPr>
+      <p:grpSpPr>
+        <a:xfrm>
+          <a:off x="0" y="0"/>
+          <a:ext cx="0" cy="0"/>
+          <a:chOff x="0" y="0"/>
+          <a:chExt cx="0" cy="0"/>
+        </a:xfrm>
+      </p:grpSpPr>
+      <mc:AlternateContent xmlns:mc="http://schemas.openxmlformats.org/markup-compatibility/2006">
+        <mc:Choice xmlns:a14="http://schemas.microsoft.com/office/drawing/2010/main" Requires="a14">
+          <p:sp>
+            <p:nvSpPr>
+              <p:cNvPr id="6" name="Inhaltsplatzhalter 5">
+                <a:extLst>
+                  <a:ext uri="{FF2B5EF4-FFF2-40B4-BE49-F238E27FC236}">
+                    <a16:creationId xmlns:a16="http://schemas.microsoft.com/office/drawing/2014/main" id="{38836AA0-D1DD-4EAF-802C-5E637633FC19}"/>
+                  </a:ext>
+                </a:extLst>
+              </p:cNvPr>
+              <p:cNvSpPr>
+                <a:spLocks noGrp="1"/>
+              </p:cNvSpPr>
+              <p:nvPr>
+                <p:ph idx="14"/>
+              </p:nvPr>
+            </p:nvSpPr>
+            <p:spPr/>
+            <p:txBody>
+              <a:bodyPr/>
+              <a:lstStyle/>
+              <a:p>
+                <a:r>
+                  <a:rPr lang="de-DE" dirty="0"/>
+                  <a:t>Vermeidung von Berechnen der abstoßenden Kräfte von allen gegebenen Knoten</a:t>
+                </a:r>
+              </a:p>
+              <a:p>
+                <a:endParaRPr lang="de-DE" dirty="0"/>
+              </a:p>
+              <a:p>
+                <a:r>
+                  <a:rPr lang="de-DE" dirty="0"/>
+                  <a:t>Reduzierung der Berechnung auf Knoten in Nachbarschaft des betrachteten Knoten</a:t>
+                </a:r>
+              </a:p>
+              <a:p>
+                <a:endParaRPr lang="de-DE" dirty="0"/>
+              </a:p>
+              <a:p>
+                <a:r>
+                  <a:rPr lang="de-DE" dirty="0"/>
+                  <a:t>Verwendung angepasster Formel zur Berechnung der abstoßenden Kräfte</a:t>
+                </a:r>
+              </a:p>
+              <a:p>
+                <a:pPr marL="285750" indent="-285750">
+                  <a:buFont typeface="Arial" panose="020B0604020202020204" pitchFamily="34" charset="0"/>
+                  <a:buChar char="•"/>
+                </a:pPr>
+                <a14:m>
+                  <m:oMath xmlns:m="http://schemas.openxmlformats.org/officeDocument/2006/math">
+                    <m:sSub>
+                      <m:sSubPr>
+                        <m:ctrlPr>
+                          <a:rPr lang="de-DE" b="0" i="1" smtClean="0">
+                            <a:latin typeface="Cambria Math" panose="02040503050406030204" pitchFamily="18" charset="0"/>
+                          </a:rPr>
+                        </m:ctrlPr>
+                      </m:sSubPr>
+                      <m:e>
+                        <m:r>
+                          <a:rPr lang="de-DE" b="0" i="1" smtClean="0">
+                            <a:latin typeface="Cambria Math" panose="02040503050406030204" pitchFamily="18" charset="0"/>
+                          </a:rPr>
+                          <m:t>𝑓</m:t>
+                        </m:r>
+                      </m:e>
+                      <m:sub>
+                        <m:r>
+                          <a:rPr lang="de-DE" b="0" i="1" smtClean="0">
+                            <a:latin typeface="Cambria Math" panose="02040503050406030204" pitchFamily="18" charset="0"/>
+                          </a:rPr>
+                          <m:t>𝑟</m:t>
+                        </m:r>
+                      </m:sub>
+                    </m:sSub>
+                    <m:r>
+                      <a:rPr lang="de-DE" b="0" i="1" smtClean="0">
+                        <a:latin typeface="Cambria Math" panose="02040503050406030204" pitchFamily="18" charset="0"/>
+                      </a:rPr>
+                      <m:t>=</m:t>
+                    </m:r>
+                    <m:f>
+                      <m:fPr>
+                        <m:ctrlPr>
+                          <a:rPr lang="de-DE" b="0" i="1" smtClean="0">
+                            <a:latin typeface="Cambria Math" panose="02040503050406030204" pitchFamily="18" charset="0"/>
+                          </a:rPr>
+                        </m:ctrlPr>
+                      </m:fPr>
+                      <m:num>
+                        <m:sSup>
+                          <m:sSupPr>
+                            <m:ctrlPr>
+                              <a:rPr lang="de-DE" b="0" i="1" smtClean="0">
+                                <a:latin typeface="Cambria Math" panose="02040503050406030204" pitchFamily="18" charset="0"/>
+                              </a:rPr>
+                            </m:ctrlPr>
+                          </m:sSupPr>
+                          <m:e>
+                            <m:r>
+                              <a:rPr lang="de-DE" b="0" i="1" smtClean="0">
+                                <a:latin typeface="Cambria Math" panose="02040503050406030204" pitchFamily="18" charset="0"/>
+                              </a:rPr>
+                              <m:t>𝑘</m:t>
+                            </m:r>
+                          </m:e>
+                          <m:sup>
+                            <m:r>
+                              <a:rPr lang="de-DE" b="0" i="1" smtClean="0">
+                                <a:latin typeface="Cambria Math" panose="02040503050406030204" pitchFamily="18" charset="0"/>
+                              </a:rPr>
+                              <m:t>2</m:t>
+                            </m:r>
+                          </m:sup>
+                        </m:sSup>
+                      </m:num>
+                      <m:den>
+                        <m:r>
+                          <a:rPr lang="de-DE" b="0" i="1" smtClean="0">
+                            <a:latin typeface="Cambria Math" panose="02040503050406030204" pitchFamily="18" charset="0"/>
+                          </a:rPr>
+                          <m:t>𝑑</m:t>
+                        </m:r>
+                      </m:den>
+                    </m:f>
+                    <m:r>
+                      <a:rPr lang="de-DE" b="0" i="1" smtClean="0">
+                        <a:latin typeface="Cambria Math" panose="02040503050406030204" pitchFamily="18" charset="0"/>
+                      </a:rPr>
+                      <m:t>∗</m:t>
+                    </m:r>
+                    <m:r>
+                      <a:rPr lang="de-DE" b="0" i="1" smtClean="0">
+                        <a:latin typeface="Cambria Math" panose="02040503050406030204" pitchFamily="18" charset="0"/>
+                      </a:rPr>
+                      <m:t>𝑢</m:t>
+                    </m:r>
+                    <m:d>
+                      <m:dPr>
+                        <m:ctrlPr>
+                          <a:rPr lang="de-DE" b="0" i="1" smtClean="0">
+                            <a:latin typeface="Cambria Math" panose="02040503050406030204" pitchFamily="18" charset="0"/>
+                          </a:rPr>
+                        </m:ctrlPr>
+                      </m:dPr>
+                      <m:e>
+                        <m:r>
+                          <a:rPr lang="de-DE" b="0" i="1" smtClean="0">
+                            <a:latin typeface="Cambria Math" panose="02040503050406030204" pitchFamily="18" charset="0"/>
+                          </a:rPr>
+                          <m:t>2</m:t>
+                        </m:r>
+                        <m:r>
+                          <a:rPr lang="de-DE" b="0" i="1" smtClean="0">
+                            <a:latin typeface="Cambria Math" panose="02040503050406030204" pitchFamily="18" charset="0"/>
+                          </a:rPr>
+                          <m:t>𝑘</m:t>
+                        </m:r>
+                        <m:r>
+                          <a:rPr lang="de-DE" b="0" i="1" smtClean="0">
+                            <a:latin typeface="Cambria Math" panose="02040503050406030204" pitchFamily="18" charset="0"/>
+                          </a:rPr>
+                          <m:t>−</m:t>
+                        </m:r>
+                        <m:r>
+                          <a:rPr lang="de-DE" b="0" i="1" smtClean="0">
+                            <a:latin typeface="Cambria Math" panose="02040503050406030204" pitchFamily="18" charset="0"/>
+                          </a:rPr>
+                          <m:t>𝑑</m:t>
+                        </m:r>
+                      </m:e>
+                    </m:d>
+                  </m:oMath>
+                </a14:m>
+                <a:endParaRPr lang="de-DE" b="0" dirty="0"/>
+              </a:p>
+              <a:p>
+                <a:pPr marL="285750" indent="-285750">
+                  <a:buFont typeface="Arial" panose="020B0604020202020204" pitchFamily="34" charset="0"/>
+                  <a:buChar char="•"/>
+                </a:pPr>
+                <a14:m>
+                  <m:oMath xmlns:m="http://schemas.openxmlformats.org/officeDocument/2006/math">
+                    <m:r>
+                      <a:rPr lang="de-DE" b="0" i="1" smtClean="0">
+                        <a:latin typeface="Cambria Math" panose="02040503050406030204" pitchFamily="18" charset="0"/>
+                      </a:rPr>
+                      <m:t>𝑢</m:t>
+                    </m:r>
+                    <m:r>
+                      <a:rPr lang="de-DE" b="0" i="1" smtClean="0">
+                        <a:latin typeface="Cambria Math" panose="02040503050406030204" pitchFamily="18" charset="0"/>
+                      </a:rPr>
+                      <m:t>=</m:t>
+                    </m:r>
+                    <m:d>
+                      <m:dPr>
+                        <m:begChr m:val="{"/>
+                        <m:endChr m:val=""/>
+                        <m:ctrlPr>
+                          <a:rPr lang="de-DE" b="0" i="1" smtClean="0">
+                            <a:latin typeface="Cambria Math" panose="02040503050406030204" pitchFamily="18" charset="0"/>
+                          </a:rPr>
+                        </m:ctrlPr>
+                      </m:dPr>
+                      <m:e>
+                        <m:eqArr>
+                          <m:eqArrPr>
+                            <m:ctrlPr>
+                              <a:rPr lang="de-DE" b="0" i="1" smtClean="0">
+                                <a:latin typeface="Cambria Math" panose="02040503050406030204" pitchFamily="18" charset="0"/>
+                              </a:rPr>
+                            </m:ctrlPr>
+                          </m:eqArrPr>
+                          <m:e>
+                            <m:r>
+                              <a:rPr lang="de-DE" b="0" i="1" smtClean="0">
+                                <a:latin typeface="Cambria Math" panose="02040503050406030204" pitchFamily="18" charset="0"/>
+                              </a:rPr>
+                              <m:t>1,</m:t>
+                            </m:r>
+                          </m:e>
+                          <m:e>
+                            <m:r>
+                              <a:rPr lang="de-DE" b="0" i="1" smtClean="0">
+                                <a:latin typeface="Cambria Math" panose="02040503050406030204" pitchFamily="18" charset="0"/>
+                              </a:rPr>
+                              <m:t>0</m:t>
+                            </m:r>
+                          </m:e>
+                        </m:eqArr>
+                        <m:r>
+                          <a:rPr lang="de-DE" b="0" i="1" smtClean="0">
+                            <a:latin typeface="Cambria Math" panose="02040503050406030204" pitchFamily="18" charset="0"/>
+                          </a:rPr>
+                          <m:t> </m:t>
+                        </m:r>
+                        <m:m>
+                          <m:mPr>
+                            <m:mcs>
+                              <m:mc>
+                                <m:mcPr>
+                                  <m:count m:val="1"/>
+                                  <m:mcJc m:val="center"/>
+                                </m:mcPr>
+                              </m:mc>
+                            </m:mcs>
+                            <m:ctrlPr>
+                              <a:rPr lang="de-DE" b="0" i="1" smtClean="0">
+                                <a:latin typeface="Cambria Math" panose="02040503050406030204" pitchFamily="18" charset="0"/>
+                              </a:rPr>
+                            </m:ctrlPr>
+                          </m:mPr>
+                          <m:mr>
+                            <m:e>
+                              <m:r>
+                                <m:rPr>
+                                  <m:brk m:alnAt="7"/>
+                                </m:rPr>
+                                <a:rPr lang="de-DE" b="0" i="1" smtClean="0">
+                                  <a:latin typeface="Cambria Math" panose="02040503050406030204" pitchFamily="18" charset="0"/>
+                                </a:rPr>
+                                <m:t>𝑓𝑎𝑙𝑙𝑠</m:t>
+                              </m:r>
+                              <m:r>
+                                <a:rPr lang="de-DE" b="0" i="1" smtClean="0">
+                                  <a:latin typeface="Cambria Math" panose="02040503050406030204" pitchFamily="18" charset="0"/>
+                                </a:rPr>
+                                <m:t> </m:t>
+                              </m:r>
+                              <m:r>
+                                <a:rPr lang="de-DE" b="0" i="1" smtClean="0">
+                                  <a:latin typeface="Cambria Math" panose="02040503050406030204" pitchFamily="18" charset="0"/>
+                                </a:rPr>
+                                <m:t>𝑥</m:t>
+                              </m:r>
+                              <m:r>
+                                <a:rPr lang="de-DE" b="0" i="1" smtClean="0">
+                                  <a:latin typeface="Cambria Math" panose="02040503050406030204" pitchFamily="18" charset="0"/>
+                                </a:rPr>
+                                <m:t>&gt;0</m:t>
+                              </m:r>
+                            </m:e>
+                          </m:mr>
+                          <m:mr>
+                            <m:e>
+                              <m:r>
+                                <a:rPr lang="de-DE" b="0" i="1" smtClean="0">
+                                  <a:latin typeface="Cambria Math" panose="02040503050406030204" pitchFamily="18" charset="0"/>
+                                </a:rPr>
+                                <m:t>𝑠𝑜𝑛𝑠𝑡</m:t>
+                              </m:r>
+                            </m:e>
+                          </m:mr>
+                        </m:m>
+                      </m:e>
+                    </m:d>
+                  </m:oMath>
+                </a14:m>
+                <a:endParaRPr lang="de-DE" dirty="0"/>
+              </a:p>
+            </p:txBody>
+          </p:sp>
+        </mc:Choice>
+        <mc:Fallback>
+          <p:sp>
+            <p:nvSpPr>
+              <p:cNvPr id="6" name="Inhaltsplatzhalter 5">
+                <a:extLst>
+                  <a:ext uri="{FF2B5EF4-FFF2-40B4-BE49-F238E27FC236}">
+                    <a16:creationId xmlns:a16="http://schemas.microsoft.com/office/drawing/2014/main" id="{38836AA0-D1DD-4EAF-802C-5E637633FC19}"/>
+                  </a:ext>
+                </a:extLst>
+              </p:cNvPr>
+              <p:cNvSpPr>
+                <a:spLocks noGrp="1" noRot="1" noChangeAspect="1" noMove="1" noResize="1" noEditPoints="1" noAdjustHandles="1" noChangeArrowheads="1" noChangeShapeType="1" noTextEdit="1"/>
+              </p:cNvSpPr>
+              <p:nvPr>
+                <p:ph idx="14"/>
+              </p:nvPr>
+            </p:nvSpPr>
+            <p:spPr>
+              <a:blipFill>
+                <a:blip r:embed="rId2"/>
+                <a:stretch>
+                  <a:fillRect l="-6414" t="-1378" r="-1749" b="-43110"/>
+                </a:stretch>
+              </a:blipFill>
+            </p:spPr>
+            <p:txBody>
+              <a:bodyPr/>
+              <a:lstStyle/>
+              <a:p>
+                <a:r>
+                  <a:rPr lang="de-DE">
+                    <a:noFill/>
+                  </a:rPr>
+                  <a:t> </a:t>
+                </a:r>
+              </a:p>
+            </p:txBody>
+          </p:sp>
+        </mc:Fallback>
+      </mc:AlternateContent>
+      <p:pic>
+        <p:nvPicPr>
+          <p:cNvPr id="9" name="Inhaltsplatzhalter 8">
+            <a:extLst>
+              <a:ext uri="{FF2B5EF4-FFF2-40B4-BE49-F238E27FC236}">
+                <a16:creationId xmlns:a16="http://schemas.microsoft.com/office/drawing/2014/main" id="{CC9F07D6-FB4A-4449-92CA-F82579151EB2}"/>
+              </a:ext>
+            </a:extLst>
+          </p:cNvPr>
+          <p:cNvPicPr>
+            <a:picLocks noGrp="1" noChangeAspect="1"/>
+          </p:cNvPicPr>
+          <p:nvPr>
+            <p:ph idx="15"/>
+          </p:nvPr>
+        </p:nvPicPr>
+        <p:blipFill>
+          <a:blip r:embed="rId3"/>
+          <a:stretch>
+            <a:fillRect/>
+          </a:stretch>
+        </p:blipFill>
+        <p:spPr>
+          <a:xfrm>
+            <a:off x="5331338" y="1782010"/>
+            <a:ext cx="2812024" cy="2712955"/>
+          </a:xfrm>
+        </p:spPr>
+      </p:pic>
+      <p:sp>
+        <p:nvSpPr>
+          <p:cNvPr id="3" name="Titel 2">
+            <a:extLst>
+              <a:ext uri="{FF2B5EF4-FFF2-40B4-BE49-F238E27FC236}">
+                <a16:creationId xmlns:a16="http://schemas.microsoft.com/office/drawing/2014/main" id="{1D15929F-6BF6-4F45-9297-A3C4C2432AE6}"/>
+              </a:ext>
+            </a:extLst>
+          </p:cNvPr>
+          <p:cNvSpPr>
+            <a:spLocks noGrp="1"/>
+          </p:cNvSpPr>
+          <p:nvPr>
+            <p:ph type="title"/>
+          </p:nvPr>
+        </p:nvSpPr>
+        <p:spPr/>
+        <p:txBody>
+          <a:bodyPr/>
+          <a:lstStyle/>
+          <a:p>
+            <a:r>
+              <a:rPr lang="de-DE" dirty="0"/>
+              <a:t>Weiterführend – </a:t>
+            </a:r>
+            <a:r>
+              <a:rPr lang="de-DE" dirty="0" err="1"/>
+              <a:t>Fruchterman</a:t>
+            </a:r>
+            <a:r>
+              <a:rPr lang="de-DE" dirty="0"/>
+              <a:t> </a:t>
+            </a:r>
+            <a:r>
+              <a:rPr lang="de-DE" dirty="0" err="1"/>
+              <a:t>Reingold</a:t>
+            </a:r>
+            <a:r>
+              <a:rPr lang="de-DE" dirty="0"/>
+              <a:t> „Grid-</a:t>
+            </a:r>
+            <a:r>
+              <a:rPr lang="de-DE" dirty="0" err="1"/>
+              <a:t>Based</a:t>
+            </a:r>
+            <a:r>
+              <a:rPr lang="de-DE" dirty="0"/>
+              <a:t>“</a:t>
+            </a:r>
+          </a:p>
+        </p:txBody>
+      </p:sp>
+      <p:sp>
+        <p:nvSpPr>
+          <p:cNvPr id="4" name="Foliennummernplatzhalter 3">
+            <a:extLst>
+              <a:ext uri="{FF2B5EF4-FFF2-40B4-BE49-F238E27FC236}">
+                <a16:creationId xmlns:a16="http://schemas.microsoft.com/office/drawing/2014/main" id="{E73E3701-61DC-4E44-A0B3-64CB24C75BDB}"/>
+              </a:ext>
+            </a:extLst>
+          </p:cNvPr>
+          <p:cNvSpPr>
+            <a:spLocks noGrp="1"/>
+          </p:cNvSpPr>
+          <p:nvPr>
+            <p:ph type="sldNum" sz="quarter" idx="16"/>
+          </p:nvPr>
+        </p:nvSpPr>
+        <p:spPr/>
+        <p:txBody>
+          <a:bodyPr/>
+          <a:lstStyle/>
+          <a:p>
+            <a:fld id="{CE58CB1E-F828-4F11-99E0-327109AF9DA4}" type="slidenum">
+              <a:rPr lang="de-DE" smtClean="0"/>
+              <a:pPr/>
+              <a:t>18</a:t>
+            </a:fld>
+            <a:endParaRPr lang="de-DE" dirty="0"/>
+          </a:p>
+        </p:txBody>
+      </p:sp>
+      <p:sp>
+        <p:nvSpPr>
+          <p:cNvPr id="5" name="Fußzeilenplatzhalter 4">
+            <a:extLst>
+              <a:ext uri="{FF2B5EF4-FFF2-40B4-BE49-F238E27FC236}">
+                <a16:creationId xmlns:a16="http://schemas.microsoft.com/office/drawing/2014/main" id="{AF2DF99A-2DA4-4693-A0E5-5FFA6173E8BF}"/>
+              </a:ext>
+            </a:extLst>
+          </p:cNvPr>
+          <p:cNvSpPr>
+            <a:spLocks noGrp="1"/>
+          </p:cNvSpPr>
+          <p:nvPr>
+            <p:ph type="ftr" sz="quarter" idx="17"/>
+          </p:nvPr>
+        </p:nvSpPr>
+        <p:spPr/>
+        <p:txBody>
+          <a:bodyPr/>
+          <a:lstStyle/>
+          <a:p>
+            <a:r>
+              <a:rPr lang="de-DE"/>
+              <a:t>Sonja Stefani | Visualisierung von vernetztem Wissen als Graph im virtuellen Raum</a:t>
+            </a:r>
+            <a:endParaRPr lang="en-US" dirty="0"/>
+          </a:p>
+        </p:txBody>
+      </p:sp>
+    </p:spTree>
+    <p:extLst>
+      <p:ext uri="{BB962C8B-B14F-4D97-AF65-F5344CB8AC3E}">
+        <p14:creationId xmlns:p14="http://schemas.microsoft.com/office/powerpoint/2010/main" val="768950290"/>
+      </p:ext>
+    </p:extLst>
+  </p:cSld>
+  <p:clrMapOvr>
+    <a:masterClrMapping/>
+  </p:clrMapOvr>
+</p:sld>
+</file>
+
+<file path=ppt/slides/slide19.xml><?xml version="1.0" encoding="utf-8"?>
+<p:sld xmlns:a="http://schemas.openxmlformats.org/drawingml/2006/main" xmlns:r="http://schemas.openxmlformats.org/officeDocument/2006/relationships" xmlns:p="http://schemas.openxmlformats.org/presentationml/2006/main">
+  <p:cSld>
+    <p:spTree>
+      <p:nvGrpSpPr>
+        <p:cNvPr id="1" name=""/>
+        <p:cNvGrpSpPr/>
+        <p:nvPr/>
+      </p:nvGrpSpPr>
+      <p:grpSpPr>
+        <a:xfrm>
+          <a:off x="0" y="0"/>
+          <a:ext cx="0" cy="0"/>
+          <a:chOff x="0" y="0"/>
+          <a:chExt cx="0" cy="0"/>
+        </a:xfrm>
+      </p:grpSpPr>
+      <p:sp>
+        <p:nvSpPr>
+          <p:cNvPr id="2" name="Inhaltsplatzhalter 1">
+            <a:extLst>
+              <a:ext uri="{FF2B5EF4-FFF2-40B4-BE49-F238E27FC236}">
+                <a16:creationId xmlns:a16="http://schemas.microsoft.com/office/drawing/2014/main" id="{07D4EC48-408C-428F-A486-FD86EC0B48DD}"/>
+              </a:ext>
+            </a:extLst>
+          </p:cNvPr>
+          <p:cNvSpPr>
+            <a:spLocks noGrp="1"/>
+          </p:cNvSpPr>
+          <p:nvPr>
+            <p:ph idx="1"/>
+          </p:nvPr>
+        </p:nvSpPr>
+        <p:spPr/>
+        <p:txBody>
+          <a:bodyPr/>
+          <a:lstStyle/>
+          <a:p>
+            <a:pPr marL="285750" indent="-285750">
+              <a:buFont typeface="Arial" panose="020B0604020202020204" pitchFamily="34" charset="0"/>
+              <a:buChar char="•"/>
+            </a:pPr>
+            <a:r>
+              <a:rPr lang="de-DE" dirty="0"/>
+              <a:t>Starte bei zufälligem oder ausgewähltem Artikel auf Wikipedia</a:t>
+            </a:r>
+          </a:p>
+          <a:p>
+            <a:pPr marL="285750" indent="-285750">
+              <a:buFont typeface="Arial" panose="020B0604020202020204" pitchFamily="34" charset="0"/>
+              <a:buChar char="•"/>
+            </a:pPr>
+            <a:r>
+              <a:rPr lang="de-DE" dirty="0"/>
+              <a:t>Zeichne Artikel und Nachbarn je nach Parameter als Graph</a:t>
+            </a:r>
+          </a:p>
+          <a:p>
+            <a:pPr marL="285750" indent="-285750">
+              <a:buFont typeface="Arial" panose="020B0604020202020204" pitchFamily="34" charset="0"/>
+              <a:buChar char="•"/>
+            </a:pPr>
+            <a:r>
+              <a:rPr lang="de-DE" dirty="0"/>
+              <a:t>Filtere dabei unwichtige Knoten je nach Parameter heraus</a:t>
+            </a:r>
+          </a:p>
+          <a:p>
+            <a:pPr marL="461963" lvl="1" indent="-285750">
+              <a:buFont typeface="Arial" panose="020B0604020202020204" pitchFamily="34" charset="0"/>
+              <a:buChar char="•"/>
+            </a:pPr>
+            <a:r>
+              <a:rPr lang="de-DE" dirty="0"/>
+              <a:t>Verwende </a:t>
+            </a:r>
+            <a:r>
+              <a:rPr lang="de-DE" dirty="0" err="1"/>
+              <a:t>Pageview</a:t>
+            </a:r>
+            <a:r>
+              <a:rPr lang="de-DE" dirty="0"/>
+              <a:t> API um wenig besuchte Artikel herauszufiltern</a:t>
+            </a:r>
+          </a:p>
+          <a:p>
+            <a:pPr marL="285750" indent="-285750">
+              <a:buFont typeface="Arial" panose="020B0604020202020204" pitchFamily="34" charset="0"/>
+              <a:buChar char="•"/>
+            </a:pPr>
+            <a:r>
+              <a:rPr lang="de-DE" dirty="0"/>
+              <a:t>Gib dem Benutzer die Möglichkeit, den aktiven Artikel „auszuklappen“ und anzusehen oder einen neuen Artikel auszuwählen</a:t>
+            </a:r>
+          </a:p>
+          <a:p>
+            <a:pPr marL="285750" indent="-285750">
+              <a:buFont typeface="Arial" panose="020B0604020202020204" pitchFamily="34" charset="0"/>
+              <a:buChar char="•"/>
+            </a:pPr>
+            <a:r>
+              <a:rPr lang="de-DE" dirty="0"/>
+              <a:t>Gib dem Benutzer die Möglichkeit, den Graphen zu drehen</a:t>
+            </a:r>
+          </a:p>
+          <a:p>
+            <a:pPr marL="285750" indent="-285750">
+              <a:buFont typeface="Arial" panose="020B0604020202020204" pitchFamily="34" charset="0"/>
+              <a:buChar char="•"/>
+            </a:pPr>
+            <a:r>
+              <a:rPr lang="de-DE" dirty="0"/>
+              <a:t>Bei Auswahl eines neuen Artikels, wende erneut Visualisierungsalgorithmus auf den neuen Teilgraphen an</a:t>
+            </a:r>
+          </a:p>
+          <a:p>
+            <a:pPr marL="285750" indent="-285750">
+              <a:buFont typeface="Arial" panose="020B0604020202020204" pitchFamily="34" charset="0"/>
+              <a:buChar char="•"/>
+            </a:pPr>
+            <a:r>
+              <a:rPr lang="de-DE" dirty="0"/>
+              <a:t>Bei Ausklappen des Artikels, wende Konzepte zur übersichtlichen Darstellung von Informationen an</a:t>
+            </a:r>
+          </a:p>
+          <a:p>
+            <a:pPr marL="461963" lvl="1" indent="-285750">
+              <a:buFont typeface="Arial" panose="020B0604020202020204" pitchFamily="34" charset="0"/>
+              <a:buChar char="•"/>
+            </a:pPr>
+            <a:endParaRPr lang="de-DE" dirty="0"/>
+          </a:p>
+        </p:txBody>
+      </p:sp>
+      <p:sp>
+        <p:nvSpPr>
+          <p:cNvPr id="3" name="Titel 2">
+            <a:extLst>
+              <a:ext uri="{FF2B5EF4-FFF2-40B4-BE49-F238E27FC236}">
+                <a16:creationId xmlns:a16="http://schemas.microsoft.com/office/drawing/2014/main" id="{ED542AE1-5F8C-4D47-B65E-1311B7A1CF6A}"/>
+              </a:ext>
+            </a:extLst>
+          </p:cNvPr>
+          <p:cNvSpPr>
+            <a:spLocks noGrp="1"/>
+          </p:cNvSpPr>
+          <p:nvPr>
+            <p:ph type="title"/>
+          </p:nvPr>
+        </p:nvSpPr>
+        <p:spPr>
+          <a:xfrm>
+            <a:off x="319090" y="972000"/>
+            <a:ext cx="8508999" cy="410369"/>
+          </a:xfrm>
+        </p:spPr>
+        <p:txBody>
+          <a:bodyPr/>
+          <a:lstStyle/>
+          <a:p>
+            <a:r>
+              <a:rPr lang="de-DE" dirty="0"/>
+              <a:t>Weiterführend – Programmkonzept</a:t>
+            </a:r>
+          </a:p>
+        </p:txBody>
+      </p:sp>
+      <p:sp>
+        <p:nvSpPr>
+          <p:cNvPr id="4" name="Foliennummernplatzhalter 3">
+            <a:extLst>
+              <a:ext uri="{FF2B5EF4-FFF2-40B4-BE49-F238E27FC236}">
+                <a16:creationId xmlns:a16="http://schemas.microsoft.com/office/drawing/2014/main" id="{8095B0AE-E1D0-42AF-B870-7A0B109FBF8F}"/>
+              </a:ext>
+            </a:extLst>
+          </p:cNvPr>
+          <p:cNvSpPr>
+            <a:spLocks noGrp="1"/>
+          </p:cNvSpPr>
+          <p:nvPr>
+            <p:ph type="sldNum" sz="quarter" idx="11"/>
+          </p:nvPr>
+        </p:nvSpPr>
+        <p:spPr/>
+        <p:txBody>
+          <a:bodyPr/>
+          <a:lstStyle/>
+          <a:p>
+            <a:fld id="{CE58CB1E-F828-4F11-99E0-327109AF9DA4}" type="slidenum">
+              <a:rPr lang="de-DE" smtClean="0"/>
+              <a:pPr/>
+              <a:t>19</a:t>
+            </a:fld>
+            <a:endParaRPr lang="de-DE" dirty="0"/>
+          </a:p>
+        </p:txBody>
+      </p:sp>
+      <p:sp>
+        <p:nvSpPr>
+          <p:cNvPr id="5" name="Fußzeilenplatzhalter 4">
+            <a:extLst>
+              <a:ext uri="{FF2B5EF4-FFF2-40B4-BE49-F238E27FC236}">
+                <a16:creationId xmlns:a16="http://schemas.microsoft.com/office/drawing/2014/main" id="{951FD105-EFAA-4395-8C61-3DC1EA0B73B5}"/>
+              </a:ext>
+            </a:extLst>
+          </p:cNvPr>
+          <p:cNvSpPr>
+            <a:spLocks noGrp="1"/>
+          </p:cNvSpPr>
+          <p:nvPr>
+            <p:ph type="ftr" sz="quarter" idx="12"/>
+          </p:nvPr>
+        </p:nvSpPr>
+        <p:spPr/>
+        <p:txBody>
+          <a:bodyPr/>
+          <a:lstStyle/>
+          <a:p>
+            <a:r>
+              <a:rPr lang="de-DE"/>
+              <a:t>Sonja Stefani | Visualisierung von vernetztem Wissen als Graph im virtuellen Raum</a:t>
+            </a:r>
+            <a:endParaRPr lang="en-US" dirty="0"/>
+          </a:p>
+        </p:txBody>
+      </p:sp>
+    </p:spTree>
+    <p:extLst>
+      <p:ext uri="{BB962C8B-B14F-4D97-AF65-F5344CB8AC3E}">
+        <p14:creationId xmlns:p14="http://schemas.microsoft.com/office/powerpoint/2010/main" val="4162064232"/>
+      </p:ext>
+    </p:extLst>
+  </p:cSld>
+  <p:clrMapOvr>
+    <a:masterClrMapping/>
+  </p:clrMapOvr>
+</p:sld>
+</file>
+
 <file path=ppt/slides/slide2.xml><?xml version="1.0" encoding="utf-8"?>
 <p:sld xmlns:a="http://schemas.openxmlformats.org/drawingml/2006/main" xmlns:r="http://schemas.openxmlformats.org/officeDocument/2006/relationships" xmlns:p="http://schemas.openxmlformats.org/presentationml/2006/main">
   <p:cSld>
@@ -8384,26 +10969,6 @@
             <a:r>
               <a:rPr lang="de-DE" dirty="0"/>
               <a:t>Gegenüberstellung von Algorithmen zur Visualisierung von Graphen</a:t>
-            </a:r>
-          </a:p>
-          <a:p>
-            <a:pPr marL="342900" indent="-342900">
-              <a:buFont typeface="+mj-lt"/>
-              <a:buAutoNum type="arabicPeriod"/>
-            </a:pPr>
-            <a:r>
-              <a:rPr lang="de-DE" dirty="0"/>
-              <a:t>Aufbau eines Programms zur Visualisierung von Wissensgraphen</a:t>
-            </a:r>
-          </a:p>
-          <a:p>
-            <a:pPr marL="342900" indent="-342900">
-              <a:buFont typeface="+mj-lt"/>
-              <a:buAutoNum type="arabicPeriod"/>
-            </a:pPr>
-            <a:r>
-              <a:rPr lang="de-DE" dirty="0"/>
-              <a:t>Vergleich der Ergebnisse der Algorithmen</a:t>
             </a:r>
           </a:p>
         </p:txBody>
@@ -8551,7 +11116,7 @@
           <a:p>
             <a:r>
               <a:rPr lang="de-DE" dirty="0"/>
-              <a:t>Idee des selbstinitiierten Lernprozesses</a:t>
+              <a:t>Idee des selbstinitiierten Lernprozesses [Terhart, 2009]</a:t>
             </a:r>
           </a:p>
         </p:txBody>
@@ -8898,7 +11463,7 @@
           <a:p>
             <a:r>
               <a:rPr lang="de-DE" dirty="0"/>
-              <a:t>Reduzierung der Komplexität zur Verbesserung der Übersichtlichkeit</a:t>
+              <a:t>Reduzierung der Komplexität zur Verbesserung der Übersichtlichkeit [Herman et al., 2000]</a:t>
             </a:r>
           </a:p>
           <a:p>
@@ -9490,8 +12055,8 @@
           <a:chExt cx="0" cy="0"/>
         </a:xfrm>
       </p:grpSpPr>
-      <mc:AlternateContent xmlns:mc="http://schemas.openxmlformats.org/markup-compatibility/2006" xmlns:a14="http://schemas.microsoft.com/office/drawing/2010/main">
-        <mc:Choice Requires="a14">
+      <mc:AlternateContent xmlns:mc="http://schemas.openxmlformats.org/markup-compatibility/2006">
+        <mc:Choice xmlns:a14="http://schemas.microsoft.com/office/drawing/2010/main" Requires="a14">
           <p:sp>
             <p:nvSpPr>
               <p:cNvPr id="7" name="Inhaltsplatzhalter 6">
@@ -9648,7 +12213,7 @@
                 </a:r>
                 <a:r>
                   <a:rPr lang="de-DE" dirty="0"/>
-                  <a:t>“</a:t>
+                  <a:t>“, nicht Federn und Ringe</a:t>
                 </a:r>
               </a:p>
               <a:p>
@@ -9677,7 +12242,7 @@
             </p:txBody>
           </p:sp>
         </mc:Choice>
-        <mc:Fallback xmlns="">
+        <mc:Fallback>
           <p:sp>
             <p:nvSpPr>
               <p:cNvPr id="7" name="Inhaltsplatzhalter 6">
@@ -9702,7 +12267,7 @@
               <a:blipFill>
                 <a:blip r:embed="rId3"/>
                 <a:stretch>
-                  <a:fillRect l="-2624" t="-1545"/>
+                  <a:fillRect l="-2624" t="-1545" r="-3499"/>
                 </a:stretch>
               </a:blipFill>
             </p:spPr>
@@ -9771,13 +12336,8 @@
             </a:pPr>
             <a:r>
               <a:rPr lang="de-DE" dirty="0"/>
-              <a:t>Finden eines guten </a:t>
-            </a:r>
-            <a:r>
-              <a:rPr lang="de-DE" dirty="0" err="1"/>
-              <a:t>Clusterings</a:t>
-            </a:r>
-            <a:endParaRPr lang="de-DE" dirty="0"/>
+              <a:t>Erstellen von Filtrierung</a:t>
+            </a:r>
           </a:p>
           <a:p>
             <a:pPr marL="285750" indent="-285750">
@@ -10780,14 +13340,19 @@
             <p:ph type="title"/>
           </p:nvPr>
         </p:nvSpPr>
-        <p:spPr/>
+        <p:spPr>
+          <a:xfrm>
+            <a:off x="319090" y="972000"/>
+            <a:ext cx="8508999" cy="1231106"/>
+          </a:xfrm>
+        </p:spPr>
         <p:txBody>
           <a:bodyPr/>
           <a:lstStyle/>
           <a:p>
             <a:r>
               <a:rPr lang="de-DE" dirty="0"/>
-              <a:t>Aufbau eines Programms zur Visualisierung von Wissensgraphen</a:t>
+              <a:t>Gegenüberstellung von Algorithmen zur Visualisierung von Graphen</a:t>
             </a:r>
             <a:br>
               <a:rPr lang="de-DE" dirty="0"/>

</xml_diff>